<commit_message>
Correção no gráfico de Total Time para 5 clientes na planilha e no PowerPoint.
</commit_message>
<xml_diff>
--- a/graphs-moret.pptx
+++ b/graphs-moret.pptx
@@ -4,6 +4,9 @@
   <p:sldMasterIdLst>
     <p:sldMasterId id="2147483648" r:id="rId1"/>
   </p:sldMasterIdLst>
+  <p:handoutMasterIdLst>
+    <p:handoutMasterId r:id="rId26"/>
+  </p:handoutMasterIdLst>
   <p:sldIdLst>
     <p:sldId id="256" r:id="rId2"/>
     <p:sldId id="257" r:id="rId3"/>
@@ -132,6 +135,7 @@
 
 <file path=ppt/charts/chart1.xml><?xml version="1.0" encoding="utf-8"?>
 <c:chartSpace xmlns:c="http://schemas.openxmlformats.org/drawingml/2006/chart" xmlns:a="http://schemas.openxmlformats.org/drawingml/2006/main" xmlns:r="http://schemas.openxmlformats.org/officeDocument/2006/relationships">
+  <c:date1904 val="1"/>
   <c:lang val="pt-BR"/>
   <c:style val="3"/>
   <c:chart>
@@ -201,19 +205,19 @@
                 <c:formatCode>0.0000</c:formatCode>
                 <c:ptCount val="5"/>
                 <c:pt idx="0">
-                  <c:v>1.6945083936055667E-3</c:v>
-                </c:pt>
-                <c:pt idx="1">
-                  <c:v>5.2900950113932326E-3</c:v>
-                </c:pt>
-                <c:pt idx="2">
-                  <c:v>8.616061210632335E-2</c:v>
+                  <c:v>1.6945083936055671E-3</c:v>
+                </c:pt>
+                <c:pt idx="1">
+                  <c:v>5.2900950113932343E-3</c:v>
+                </c:pt>
+                <c:pt idx="2">
+                  <c:v>8.6160612106323364E-2</c:v>
                 </c:pt>
                 <c:pt idx="3">
                   <c:v>0.52489698330560997</c:v>
                 </c:pt>
                 <c:pt idx="4">
-                  <c:v>8.8842568238576334</c:v>
+                  <c:v>8.8842568238576352</c:v>
                 </c:pt>
               </c:numCache>
             </c:numRef>
@@ -263,19 +267,19 @@
                 <c:formatCode>0.0000</c:formatCode>
                 <c:ptCount val="5"/>
                 <c:pt idx="0">
-                  <c:v>1.0186853408813501E-2</c:v>
-                </c:pt>
-                <c:pt idx="1">
-                  <c:v>2.5026895205179669E-2</c:v>
-                </c:pt>
-                <c:pt idx="2">
-                  <c:v>0.40553862333297669</c:v>
+                  <c:v>1.0186853408813503E-2</c:v>
+                </c:pt>
+                <c:pt idx="1">
+                  <c:v>2.5026895205179676E-2</c:v>
+                </c:pt>
+                <c:pt idx="2">
+                  <c:v>0.4055386233329768</c:v>
                 </c:pt>
                 <c:pt idx="3">
                   <c:v>2.3096298885345332</c:v>
                 </c:pt>
                 <c:pt idx="4">
-                  <c:v>39.493453658421998</c:v>
+                  <c:v>39.493453658422006</c:v>
                 </c:pt>
               </c:numCache>
             </c:numRef>
@@ -325,13 +329,13 @@
                 <c:formatCode>0.0000</c:formatCode>
                 <c:ptCount val="5"/>
                 <c:pt idx="0">
-                  <c:v>1.1324619849522669E-2</c:v>
-                </c:pt>
-                <c:pt idx="1">
-                  <c:v>5.0023072957992666E-2</c:v>
-                </c:pt>
-                <c:pt idx="2">
-                  <c:v>0.80456972519556669</c:v>
+                  <c:v>1.1324619849522672E-2</c:v>
+                </c:pt>
+                <c:pt idx="1">
+                  <c:v>5.0023072957992687E-2</c:v>
+                </c:pt>
+                <c:pt idx="2">
+                  <c:v>0.80456972519556658</c:v>
                 </c:pt>
                 <c:pt idx="3">
                   <c:v>4.6152388628323671</c:v>
@@ -384,10 +388,10 @@
                 <c:formatCode>0.0000</c:formatCode>
                 <c:ptCount val="5"/>
                 <c:pt idx="0">
-                  <c:v>1.7366109689076668E-2</c:v>
-                </c:pt>
-                <c:pt idx="1">
-                  <c:v>7.7328193717532676E-2</c:v>
+                  <c:v>1.7366109689076675E-2</c:v>
+                </c:pt>
+                <c:pt idx="1">
+                  <c:v>7.7328193717532703E-2</c:v>
                 </c:pt>
                 <c:pt idx="2">
                   <c:v>1.1825959576500999</c:v>
@@ -400,11 +404,11 @@
           </c:val>
         </c:ser>
         <c:marker val="1"/>
-        <c:axId val="80497280"/>
-        <c:axId val="45167360"/>
+        <c:axId val="67241856"/>
+        <c:axId val="67244032"/>
       </c:lineChart>
       <c:catAx>
-        <c:axId val="80497280"/>
+        <c:axId val="67241856"/>
         <c:scaling>
           <c:orientation val="minMax"/>
         </c:scaling>
@@ -428,14 +432,14 @@
           <c:layout/>
         </c:title>
         <c:tickLblPos val="nextTo"/>
-        <c:crossAx val="45167360"/>
+        <c:crossAx val="67244032"/>
         <c:crosses val="autoZero"/>
         <c:auto val="1"/>
         <c:lblAlgn val="ctr"/>
         <c:lblOffset val="100"/>
       </c:catAx>
       <c:valAx>
-        <c:axId val="45167360"/>
+        <c:axId val="67244032"/>
         <c:scaling>
           <c:orientation val="minMax"/>
         </c:scaling>
@@ -461,7 +465,7 @@
         </c:title>
         <c:numFmt formatCode="0.0000" sourceLinked="1"/>
         <c:tickLblPos val="nextTo"/>
-        <c:crossAx val="80497280"/>
+        <c:crossAx val="67241856"/>
         <c:crosses val="autoZero"/>
         <c:crossBetween val="between"/>
       </c:valAx>
@@ -547,19 +551,19 @@
                 <c:formatCode>0.0000</c:formatCode>
                 <c:ptCount val="5"/>
                 <c:pt idx="0">
-                  <c:v>4.5691013336181668E-2</c:v>
-                </c:pt>
-                <c:pt idx="1">
-                  <c:v>8.9537700017293331E-2</c:v>
-                </c:pt>
-                <c:pt idx="2">
-                  <c:v>0.43585880597432336</c:v>
+                  <c:v>4.5691013336181682E-2</c:v>
+                </c:pt>
+                <c:pt idx="1">
+                  <c:v>8.9537700017293359E-2</c:v>
+                </c:pt>
+                <c:pt idx="2">
+                  <c:v>0.43585880597432347</c:v>
                 </c:pt>
                 <c:pt idx="3">
                   <c:v>3.4288706779480003</c:v>
                 </c:pt>
                 <c:pt idx="4">
-                  <c:v>40.213989734649665</c:v>
+                  <c:v>40.213989734649658</c:v>
                 </c:pt>
               </c:numCache>
             </c:numRef>
@@ -609,10 +613,10 @@
                 <c:formatCode>0.0000</c:formatCode>
                 <c:ptCount val="5"/>
                 <c:pt idx="0">
-                  <c:v>0.20418125788370667</c:v>
-                </c:pt>
-                <c:pt idx="1">
-                  <c:v>0.37549309730529662</c:v>
+                  <c:v>0.2041812578837067</c:v>
+                </c:pt>
+                <c:pt idx="1">
+                  <c:v>0.37549309730529667</c:v>
                 </c:pt>
                 <c:pt idx="2">
                   <c:v>1.8550400892893333</c:v>
@@ -621,7 +625,7 @@
                   <c:v>16.794017903010332</c:v>
                 </c:pt>
                 <c:pt idx="4">
-                  <c:v>206.55737091700666</c:v>
+                  <c:v>206.55737091700669</c:v>
                 </c:pt>
               </c:numCache>
             </c:numRef>
@@ -677,10 +681,10 @@
                   <c:v>0.63219799995422343</c:v>
                 </c:pt>
                 <c:pt idx="2">
-                  <c:v>3.1823965072631668</c:v>
-                </c:pt>
-                <c:pt idx="3">
-                  <c:v>32.517204419772</c:v>
+                  <c:v>3.1823965072631673</c:v>
+                </c:pt>
+                <c:pt idx="3">
+                  <c:v>32.517204419771986</c:v>
                 </c:pt>
               </c:numCache>
             </c:numRef>
@@ -730,27 +734,27 @@
                 <c:formatCode>0.0000</c:formatCode>
                 <c:ptCount val="5"/>
                 <c:pt idx="0">
-                  <c:v>0.59184562365214</c:v>
-                </c:pt>
-                <c:pt idx="1">
-                  <c:v>0.91286106109619336</c:v>
-                </c:pt>
-                <c:pt idx="2">
-                  <c:v>6.9172789573669</c:v>
-                </c:pt>
-                <c:pt idx="3">
-                  <c:v>49.805609517627339</c:v>
+                  <c:v>0.59184562365214011</c:v>
+                </c:pt>
+                <c:pt idx="1">
+                  <c:v>0.91286106109619347</c:v>
+                </c:pt>
+                <c:pt idx="2">
+                  <c:v>6.9172789573668991</c:v>
+                </c:pt>
+                <c:pt idx="3">
+                  <c:v>49.805609517627325</c:v>
                 </c:pt>
               </c:numCache>
             </c:numRef>
           </c:val>
         </c:ser>
         <c:marker val="1"/>
-        <c:axId val="66152320"/>
-        <c:axId val="66172800"/>
+        <c:axId val="71455488"/>
+        <c:axId val="71457408"/>
       </c:lineChart>
       <c:catAx>
-        <c:axId val="66152320"/>
+        <c:axId val="71455488"/>
         <c:scaling>
           <c:orientation val="minMax"/>
         </c:scaling>
@@ -774,14 +778,14 @@
           <c:layout/>
         </c:title>
         <c:tickLblPos val="nextTo"/>
-        <c:crossAx val="66172800"/>
+        <c:crossAx val="71457408"/>
         <c:crosses val="autoZero"/>
         <c:auto val="1"/>
         <c:lblAlgn val="ctr"/>
         <c:lblOffset val="100"/>
       </c:catAx>
       <c:valAx>
-        <c:axId val="66172800"/>
+        <c:axId val="71457408"/>
         <c:scaling>
           <c:orientation val="minMax"/>
         </c:scaling>
@@ -807,7 +811,7 @@
         </c:title>
         <c:numFmt formatCode="0.0000" sourceLinked="1"/>
         <c:tickLblPos val="nextTo"/>
-        <c:crossAx val="66152320"/>
+        <c:crossAx val="71455488"/>
         <c:crosses val="autoZero"/>
         <c:crossBetween val="between"/>
       </c:valAx>
@@ -901,19 +905,19 @@
                 <c:formatCode>0.0000</c:formatCode>
                 <c:ptCount val="5"/>
                 <c:pt idx="0">
-                  <c:v>8.5972944895426322E-3</c:v>
-                </c:pt>
-                <c:pt idx="1">
-                  <c:v>2.9120445251465E-2</c:v>
-                </c:pt>
-                <c:pt idx="2">
-                  <c:v>0.29380440711975003</c:v>
+                  <c:v>8.597294489542634E-3</c:v>
+                </c:pt>
+                <c:pt idx="1">
+                  <c:v>2.9120445251464996E-2</c:v>
+                </c:pt>
+                <c:pt idx="2">
+                  <c:v>0.2938044071197502</c:v>
                 </c:pt>
                 <c:pt idx="3">
                   <c:v>2.5660292307535664</c:v>
                 </c:pt>
                 <c:pt idx="4">
-                  <c:v>52.394349018732669</c:v>
+                  <c:v>52.394349018732655</c:v>
                 </c:pt>
               </c:numCache>
             </c:numRef>
@@ -963,16 +967,16 @@
                 <c:formatCode>0.0000</c:formatCode>
                 <c:ptCount val="5"/>
                 <c:pt idx="0">
-                  <c:v>3.7217839558919337E-2</c:v>
-                </c:pt>
-                <c:pt idx="1">
-                  <c:v>0.13084851900736336</c:v>
+                  <c:v>3.7217839558919351E-2</c:v>
+                </c:pt>
+                <c:pt idx="1">
+                  <c:v>0.13084851900736338</c:v>
                 </c:pt>
                 <c:pt idx="2">
                   <c:v>1.1538695494333668</c:v>
                 </c:pt>
                 <c:pt idx="3">
-                  <c:v>11.289022588729999</c:v>
+                  <c:v>11.289022588730001</c:v>
                 </c:pt>
                 <c:pt idx="4">
                   <c:v>197.50086808204665</c:v>
@@ -1025,16 +1029,16 @@
                 <c:formatCode>0.0000</c:formatCode>
                 <c:ptCount val="5"/>
                 <c:pt idx="0">
-                  <c:v>0.11103627681732033</c:v>
-                </c:pt>
-                <c:pt idx="1">
-                  <c:v>0.24618312517802002</c:v>
-                </c:pt>
-                <c:pt idx="2">
-                  <c:v>2.2004075686136666</c:v>
-                </c:pt>
-                <c:pt idx="3">
-                  <c:v>22.885911679267668</c:v>
+                  <c:v>0.11103627681732034</c:v>
+                </c:pt>
+                <c:pt idx="1">
+                  <c:v>0.24618312517802005</c:v>
+                </c:pt>
+                <c:pt idx="2">
+                  <c:v>2.200407568613667</c:v>
+                </c:pt>
+                <c:pt idx="3">
+                  <c:v>22.885911679267664</c:v>
                 </c:pt>
               </c:numCache>
             </c:numRef>
@@ -1084,13 +1088,13 @@
                 <c:formatCode>0.0000</c:formatCode>
                 <c:ptCount val="5"/>
                 <c:pt idx="0">
-                  <c:v>0.13618071873982998</c:v>
-                </c:pt>
-                <c:pt idx="1">
-                  <c:v>0.3729924837748233</c:v>
-                </c:pt>
-                <c:pt idx="2">
-                  <c:v>3.3767390039231997</c:v>
+                  <c:v>0.13618071873982995</c:v>
+                </c:pt>
+                <c:pt idx="1">
+                  <c:v>0.37299248377482341</c:v>
+                </c:pt>
+                <c:pt idx="2">
+                  <c:v>3.3767390039231993</c:v>
                 </c:pt>
                 <c:pt idx="3">
                   <c:v>31.319233465194333</c:v>
@@ -1100,11 +1104,11 @@
           </c:val>
         </c:ser>
         <c:marker val="1"/>
-        <c:axId val="66907136"/>
-        <c:axId val="73754112"/>
+        <c:axId val="71387008"/>
+        <c:axId val="71397376"/>
       </c:lineChart>
       <c:catAx>
-        <c:axId val="66907136"/>
+        <c:axId val="71387008"/>
         <c:scaling>
           <c:orientation val="minMax"/>
         </c:scaling>
@@ -1128,14 +1132,14 @@
           <c:layout/>
         </c:title>
         <c:tickLblPos val="nextTo"/>
-        <c:crossAx val="73754112"/>
+        <c:crossAx val="71397376"/>
         <c:crosses val="autoZero"/>
         <c:auto val="1"/>
         <c:lblAlgn val="ctr"/>
         <c:lblOffset val="100"/>
       </c:catAx>
       <c:valAx>
-        <c:axId val="73754112"/>
+        <c:axId val="71397376"/>
         <c:scaling>
           <c:orientation val="minMax"/>
         </c:scaling>
@@ -1161,7 +1165,7 @@
         </c:title>
         <c:numFmt formatCode="0.0000" sourceLinked="1"/>
         <c:tickLblPos val="nextTo"/>
-        <c:crossAx val="66907136"/>
+        <c:crossAx val="71387008"/>
         <c:crosses val="autoZero"/>
         <c:crossBetween val="between"/>
       </c:valAx>
@@ -1258,7 +1262,7 @@
                   <c:v>1.2877543767293366E-2</c:v>
                 </c:pt>
                 <c:pt idx="1">
-                  <c:v>2.9506365458170664E-2</c:v>
+                  <c:v>2.9506365458170671E-2</c:v>
                 </c:pt>
                 <c:pt idx="2">
                   <c:v>0.46261970202128327</c:v>
@@ -1267,7 +1271,7 @@
                   <c:v>2.5529419581095336</c:v>
                 </c:pt>
                 <c:pt idx="4">
-                  <c:v>40.948424736658666</c:v>
+                  <c:v>40.948424736658659</c:v>
                 </c:pt>
               </c:numCache>
             </c:numRef>
@@ -1317,7 +1321,7 @@
                 <c:formatCode>0.0000</c:formatCode>
                 <c:ptCount val="5"/>
                 <c:pt idx="0">
-                  <c:v>3.4685961405435999E-2</c:v>
+                  <c:v>3.4685961405436005E-2</c:v>
                 </c:pt>
                 <c:pt idx="1">
                   <c:v>0.14406822522481336</c:v>
@@ -1326,10 +1330,10 @@
                   <c:v>1.3146018664041998</c:v>
                 </c:pt>
                 <c:pt idx="3">
-                  <c:v>11.210631418228333</c:v>
+                  <c:v>11.210631418228335</c:v>
                 </c:pt>
                 <c:pt idx="4">
-                  <c:v>205.52975365320665</c:v>
+                  <c:v>205.52975365320663</c:v>
                 </c:pt>
               </c:numCache>
             </c:numRef>
@@ -1379,13 +1383,13 @@
                 <c:formatCode>0.0000</c:formatCode>
                 <c:ptCount val="5"/>
                 <c:pt idx="0">
-                  <c:v>7.0926904678344671E-2</c:v>
-                </c:pt>
-                <c:pt idx="1">
-                  <c:v>0.36912055810292665</c:v>
-                </c:pt>
-                <c:pt idx="2">
-                  <c:v>2.5422107060750334</c:v>
+                  <c:v>7.0926904678344685E-2</c:v>
+                </c:pt>
+                <c:pt idx="1">
+                  <c:v>0.36912055810292671</c:v>
+                </c:pt>
+                <c:pt idx="2">
+                  <c:v>2.5422107060750339</c:v>
                 </c:pt>
                 <c:pt idx="3">
                   <c:v>23.121320072809667</c:v>
@@ -1441,24 +1445,24 @@
                   <c:v>0.11103753513760001</c:v>
                 </c:pt>
                 <c:pt idx="1">
-                  <c:v>0.39578368398878333</c:v>
-                </c:pt>
-                <c:pt idx="2">
-                  <c:v>3.5388888359070001</c:v>
-                </c:pt>
-                <c:pt idx="3">
-                  <c:v>33.837389787038333</c:v>
+                  <c:v>0.39578368398878344</c:v>
+                </c:pt>
+                <c:pt idx="2">
+                  <c:v>3.5388888359069997</c:v>
+                </c:pt>
+                <c:pt idx="3">
+                  <c:v>33.837389787038319</c:v>
                 </c:pt>
               </c:numCache>
             </c:numRef>
           </c:val>
         </c:ser>
         <c:marker val="1"/>
-        <c:axId val="75763072"/>
-        <c:axId val="75795456"/>
+        <c:axId val="71502848"/>
+        <c:axId val="71517312"/>
       </c:lineChart>
       <c:catAx>
-        <c:axId val="75763072"/>
+        <c:axId val="71502848"/>
         <c:scaling>
           <c:orientation val="minMax"/>
         </c:scaling>
@@ -1482,14 +1486,14 @@
           <c:layout/>
         </c:title>
         <c:tickLblPos val="nextTo"/>
-        <c:crossAx val="75795456"/>
+        <c:crossAx val="71517312"/>
         <c:crosses val="autoZero"/>
         <c:auto val="1"/>
         <c:lblAlgn val="ctr"/>
         <c:lblOffset val="100"/>
       </c:catAx>
       <c:valAx>
-        <c:axId val="75795456"/>
+        <c:axId val="71517312"/>
         <c:scaling>
           <c:orientation val="minMax"/>
         </c:scaling>
@@ -1515,7 +1519,7 @@
         </c:title>
         <c:numFmt formatCode="0.0000" sourceLinked="1"/>
         <c:tickLblPos val="nextTo"/>
-        <c:crossAx val="75763072"/>
+        <c:crossAx val="71502848"/>
         <c:crosses val="autoZero"/>
         <c:crossBetween val="between"/>
       </c:valAx>
@@ -1600,19 +1604,19 @@
                 <c:formatCode>0.0000</c:formatCode>
                 <c:ptCount val="5"/>
                 <c:pt idx="0">
-                  <c:v>8.8080565134684655E-3</c:v>
-                </c:pt>
-                <c:pt idx="1">
-                  <c:v>2.3829301198323664E-2</c:v>
-                </c:pt>
-                <c:pt idx="2">
-                  <c:v>0.41197864214579</c:v>
+                  <c:v>8.808056513468469E-3</c:v>
+                </c:pt>
+                <c:pt idx="1">
+                  <c:v>2.3829301198323671E-2</c:v>
+                </c:pt>
+                <c:pt idx="2">
+                  <c:v>0.41197864214579005</c:v>
                 </c:pt>
                 <c:pt idx="3">
                   <c:v>2.5611866315206</c:v>
                 </c:pt>
                 <c:pt idx="4">
-                  <c:v>36.06085324287433</c:v>
+                  <c:v>36.060853242874337</c:v>
                 </c:pt>
               </c:numCache>
             </c:numRef>
@@ -1662,19 +1666,19 @@
                 <c:formatCode>0.0000</c:formatCode>
                 <c:ptCount val="5"/>
                 <c:pt idx="0">
-                  <c:v>4.5691013336181668E-2</c:v>
-                </c:pt>
-                <c:pt idx="1">
-                  <c:v>8.9537700017293331E-2</c:v>
-                </c:pt>
-                <c:pt idx="2">
-                  <c:v>0.43585880597432336</c:v>
+                  <c:v>4.5691013336181682E-2</c:v>
+                </c:pt>
+                <c:pt idx="1">
+                  <c:v>8.9537700017293359E-2</c:v>
+                </c:pt>
+                <c:pt idx="2">
+                  <c:v>0.43585880597432347</c:v>
                 </c:pt>
                 <c:pt idx="3">
                   <c:v>3.4288706779480003</c:v>
                 </c:pt>
                 <c:pt idx="4">
-                  <c:v>40.213989734649665</c:v>
+                  <c:v>40.213989734649658</c:v>
                 </c:pt>
               </c:numCache>
             </c:numRef>
@@ -1701,19 +1705,19 @@
                 <c:formatCode>0.0000</c:formatCode>
                 <c:ptCount val="5"/>
                 <c:pt idx="0">
-                  <c:v>8.5972944895426322E-3</c:v>
-                </c:pt>
-                <c:pt idx="1">
-                  <c:v>2.9120445251465E-2</c:v>
-                </c:pt>
-                <c:pt idx="2">
-                  <c:v>0.29380440711975003</c:v>
+                  <c:v>8.597294489542634E-3</c:v>
+                </c:pt>
+                <c:pt idx="1">
+                  <c:v>2.9120445251464996E-2</c:v>
+                </c:pt>
+                <c:pt idx="2">
+                  <c:v>0.2938044071197502</c:v>
                 </c:pt>
                 <c:pt idx="3">
                   <c:v>2.5660292307535664</c:v>
                 </c:pt>
                 <c:pt idx="4">
-                  <c:v>52.394349018732669</c:v>
+                  <c:v>52.394349018732655</c:v>
                 </c:pt>
               </c:numCache>
             </c:numRef>
@@ -1743,7 +1747,7 @@
                   <c:v>1.2877543767293366E-2</c:v>
                 </c:pt>
                 <c:pt idx="1">
-                  <c:v>2.9506365458170664E-2</c:v>
+                  <c:v>2.9506365458170671E-2</c:v>
                 </c:pt>
                 <c:pt idx="2">
                   <c:v>0.46261970202128327</c:v>
@@ -1752,18 +1756,18 @@
                   <c:v>2.5529419581095336</c:v>
                 </c:pt>
                 <c:pt idx="4">
-                  <c:v>40.948424736658666</c:v>
+                  <c:v>40.948424736658659</c:v>
                 </c:pt>
               </c:numCache>
             </c:numRef>
           </c:val>
         </c:ser>
         <c:marker val="1"/>
-        <c:axId val="76223616"/>
-        <c:axId val="76232960"/>
+        <c:axId val="71565696"/>
+        <c:axId val="71567616"/>
       </c:lineChart>
       <c:catAx>
-        <c:axId val="76223616"/>
+        <c:axId val="71565696"/>
         <c:scaling>
           <c:orientation val="minMax"/>
         </c:scaling>
@@ -1787,14 +1791,14 @@
           <c:layout/>
         </c:title>
         <c:tickLblPos val="nextTo"/>
-        <c:crossAx val="76232960"/>
+        <c:crossAx val="71567616"/>
         <c:crosses val="autoZero"/>
         <c:auto val="1"/>
         <c:lblAlgn val="ctr"/>
         <c:lblOffset val="100"/>
       </c:catAx>
       <c:valAx>
-        <c:axId val="76232960"/>
+        <c:axId val="71567616"/>
         <c:scaling>
           <c:orientation val="minMax"/>
         </c:scaling>
@@ -1820,7 +1824,7 @@
         </c:title>
         <c:numFmt formatCode="0.0000" sourceLinked="1"/>
         <c:tickLblPos val="nextTo"/>
-        <c:crossAx val="76223616"/>
+        <c:crossAx val="71565696"/>
         <c:crosses val="autoZero"/>
         <c:crossBetween val="between"/>
       </c:valAx>
@@ -1905,10 +1909,10 @@
                 <c:formatCode>0.0000</c:formatCode>
                 <c:ptCount val="5"/>
                 <c:pt idx="0">
-                  <c:v>0.115225156148275</c:v>
-                </c:pt>
-                <c:pt idx="1">
-                  <c:v>0.11600995063781666</c:v>
+                  <c:v>0.11522515614827503</c:v>
+                </c:pt>
+                <c:pt idx="1">
+                  <c:v>0.11600995063781665</c:v>
                 </c:pt>
                 <c:pt idx="2">
                   <c:v>1.7640364964803332</c:v>
@@ -1917,7 +1921,7 @@
                   <c:v>10.2913300991056</c:v>
                 </c:pt>
                 <c:pt idx="4">
-                  <c:v>162.72489585876667</c:v>
+                  <c:v>162.72489585876664</c:v>
                 </c:pt>
               </c:numCache>
             </c:numRef>
@@ -1967,10 +1971,10 @@
                 <c:formatCode>0.0000</c:formatCode>
                 <c:ptCount val="5"/>
                 <c:pt idx="0">
-                  <c:v>0.20418125788370667</c:v>
-                </c:pt>
-                <c:pt idx="1">
-                  <c:v>0.37549309730529662</c:v>
+                  <c:v>0.2041812578837067</c:v>
+                </c:pt>
+                <c:pt idx="1">
+                  <c:v>0.37549309730529667</c:v>
                 </c:pt>
                 <c:pt idx="2">
                   <c:v>1.8550400892893333</c:v>
@@ -1979,7 +1983,7 @@
                   <c:v>16.794017903010332</c:v>
                 </c:pt>
                 <c:pt idx="4">
-                  <c:v>206.55737091700666</c:v>
+                  <c:v>206.55737091700669</c:v>
                 </c:pt>
               </c:numCache>
             </c:numRef>
@@ -2006,16 +2010,16 @@
                 <c:formatCode>0.0000</c:formatCode>
                 <c:ptCount val="5"/>
                 <c:pt idx="0">
-                  <c:v>3.7217839558919337E-2</c:v>
-                </c:pt>
-                <c:pt idx="1">
-                  <c:v>0.13084851900736336</c:v>
+                  <c:v>3.7217839558919351E-2</c:v>
+                </c:pt>
+                <c:pt idx="1">
+                  <c:v>0.13084851900736338</c:v>
                 </c:pt>
                 <c:pt idx="2">
                   <c:v>1.1538695494333668</c:v>
                 </c:pt>
                 <c:pt idx="3">
-                  <c:v>11.289022588729999</c:v>
+                  <c:v>11.289022588730001</c:v>
                 </c:pt>
                 <c:pt idx="4">
                   <c:v>197.50086808204665</c:v>
@@ -2045,7 +2049,7 @@
                 <c:formatCode>0.0000</c:formatCode>
                 <c:ptCount val="5"/>
                 <c:pt idx="0">
-                  <c:v>3.4685961405435999E-2</c:v>
+                  <c:v>3.4685961405436005E-2</c:v>
                 </c:pt>
                 <c:pt idx="1">
                   <c:v>0.14406822522481336</c:v>
@@ -2054,21 +2058,21 @@
                   <c:v>1.3146018664041998</c:v>
                 </c:pt>
                 <c:pt idx="3">
-                  <c:v>11.210631418228333</c:v>
+                  <c:v>11.210631418228335</c:v>
                 </c:pt>
                 <c:pt idx="4">
-                  <c:v>205.52975365320665</c:v>
+                  <c:v>205.52975365320663</c:v>
                 </c:pt>
               </c:numCache>
             </c:numRef>
           </c:val>
         </c:ser>
         <c:marker val="1"/>
-        <c:axId val="76617216"/>
-        <c:axId val="76623872"/>
+        <c:axId val="71611904"/>
+        <c:axId val="71613824"/>
       </c:lineChart>
       <c:catAx>
-        <c:axId val="76617216"/>
+        <c:axId val="71611904"/>
         <c:scaling>
           <c:orientation val="minMax"/>
         </c:scaling>
@@ -2092,14 +2096,14 @@
           <c:layout/>
         </c:title>
         <c:tickLblPos val="nextTo"/>
-        <c:crossAx val="76623872"/>
+        <c:crossAx val="71613824"/>
         <c:crosses val="autoZero"/>
         <c:auto val="1"/>
         <c:lblAlgn val="ctr"/>
         <c:lblOffset val="100"/>
       </c:catAx>
       <c:valAx>
-        <c:axId val="76623872"/>
+        <c:axId val="71613824"/>
         <c:scaling>
           <c:orientation val="minMax"/>
         </c:scaling>
@@ -2125,7 +2129,7 @@
         </c:title>
         <c:numFmt formatCode="0.0000" sourceLinked="1"/>
         <c:tickLblPos val="nextTo"/>
-        <c:crossAx val="76617216"/>
+        <c:crossAx val="71611904"/>
         <c:crosses val="autoZero"/>
         <c:crossBetween val="between"/>
       </c:valAx>
@@ -2219,7 +2223,7 @@
                   <c:v>3.5624407370885329</c:v>
                 </c:pt>
                 <c:pt idx="3">
-                  <c:v>20.826281388600666</c:v>
+                  <c:v>20.82628138860067</c:v>
                 </c:pt>
               </c:numCache>
             </c:numRef>
@@ -2275,10 +2279,10 @@
                   <c:v>0.63219799995422343</c:v>
                 </c:pt>
                 <c:pt idx="2">
-                  <c:v>3.1823965072631668</c:v>
-                </c:pt>
-                <c:pt idx="3">
-                  <c:v>32.517204419772</c:v>
+                  <c:v>3.1823965072631673</c:v>
+                </c:pt>
+                <c:pt idx="3">
+                  <c:v>32.517204419771986</c:v>
                 </c:pt>
               </c:numCache>
             </c:numRef>
@@ -2305,16 +2309,16 @@
                 <c:formatCode>0.0000</c:formatCode>
                 <c:ptCount val="5"/>
                 <c:pt idx="0">
-                  <c:v>0.11103627681732033</c:v>
-                </c:pt>
-                <c:pt idx="1">
-                  <c:v>0.24618312517802002</c:v>
-                </c:pt>
-                <c:pt idx="2">
-                  <c:v>2.2004075686136666</c:v>
-                </c:pt>
-                <c:pt idx="3">
-                  <c:v>22.885911679267668</c:v>
+                  <c:v>0.11103627681732034</c:v>
+                </c:pt>
+                <c:pt idx="1">
+                  <c:v>0.24618312517802005</c:v>
+                </c:pt>
+                <c:pt idx="2">
+                  <c:v>2.200407568613667</c:v>
+                </c:pt>
+                <c:pt idx="3">
+                  <c:v>22.885911679267664</c:v>
                 </c:pt>
               </c:numCache>
             </c:numRef>
@@ -2341,13 +2345,13 @@
                 <c:formatCode>0.0000</c:formatCode>
                 <c:ptCount val="5"/>
                 <c:pt idx="0">
-                  <c:v>7.0926904678344671E-2</c:v>
-                </c:pt>
-                <c:pt idx="1">
-                  <c:v>0.36912055810292665</c:v>
-                </c:pt>
-                <c:pt idx="2">
-                  <c:v>2.5422107060750334</c:v>
+                  <c:v>7.0926904678344685E-2</c:v>
+                </c:pt>
+                <c:pt idx="1">
+                  <c:v>0.36912055810292671</c:v>
+                </c:pt>
+                <c:pt idx="2">
+                  <c:v>2.5422107060750339</c:v>
                 </c:pt>
                 <c:pt idx="3">
                   <c:v>23.121320072809667</c:v>
@@ -2357,11 +2361,11 @@
           </c:val>
         </c:ser>
         <c:marker val="1"/>
-        <c:axId val="81987456"/>
-        <c:axId val="94222976"/>
+        <c:axId val="71678592"/>
+        <c:axId val="71688960"/>
       </c:lineChart>
       <c:catAx>
-        <c:axId val="81987456"/>
+        <c:axId val="71678592"/>
         <c:scaling>
           <c:orientation val="minMax"/>
         </c:scaling>
@@ -2385,14 +2389,14 @@
           <c:layout/>
         </c:title>
         <c:tickLblPos val="nextTo"/>
-        <c:crossAx val="94222976"/>
+        <c:crossAx val="71688960"/>
         <c:crosses val="autoZero"/>
         <c:auto val="1"/>
         <c:lblAlgn val="ctr"/>
         <c:lblOffset val="100"/>
       </c:catAx>
       <c:valAx>
-        <c:axId val="94222976"/>
+        <c:axId val="71688960"/>
         <c:scaling>
           <c:orientation val="minMax"/>
         </c:scaling>
@@ -2418,7 +2422,7 @@
         </c:title>
         <c:numFmt formatCode="0.0000" sourceLinked="1"/>
         <c:tickLblPos val="nextTo"/>
-        <c:crossAx val="81987456"/>
+        <c:crossAx val="71678592"/>
         <c:crosses val="autoZero"/>
         <c:crossBetween val="between"/>
       </c:valAx>
@@ -2503,16 +2507,16 @@
                 <c:formatCode>0.0000</c:formatCode>
                 <c:ptCount val="5"/>
                 <c:pt idx="0">
-                  <c:v>0.11224088668823334</c:v>
-                </c:pt>
-                <c:pt idx="1">
-                  <c:v>0.38475763003031332</c:v>
-                </c:pt>
-                <c:pt idx="2">
-                  <c:v>4.9616109583112999</c:v>
-                </c:pt>
-                <c:pt idx="3">
-                  <c:v>33.610920672946328</c:v>
+                  <c:v>0.11224088668823336</c:v>
+                </c:pt>
+                <c:pt idx="1">
+                  <c:v>0.38475763003031327</c:v>
+                </c:pt>
+                <c:pt idx="2">
+                  <c:v>4.9616109583112991</c:v>
+                </c:pt>
+                <c:pt idx="3">
+                  <c:v>33.610920672946321</c:v>
                 </c:pt>
               </c:numCache>
             </c:numRef>
@@ -2562,16 +2566,16 @@
                 <c:formatCode>0.0000</c:formatCode>
                 <c:ptCount val="5"/>
                 <c:pt idx="0">
-                  <c:v>0.59184562365214</c:v>
-                </c:pt>
-                <c:pt idx="1">
-                  <c:v>0.91286106109619336</c:v>
-                </c:pt>
-                <c:pt idx="2">
-                  <c:v>6.9172789573669</c:v>
-                </c:pt>
-                <c:pt idx="3">
-                  <c:v>49.805609517627339</c:v>
+                  <c:v>0.59184562365214011</c:v>
+                </c:pt>
+                <c:pt idx="1">
+                  <c:v>0.91286106109619347</c:v>
+                </c:pt>
+                <c:pt idx="2">
+                  <c:v>6.9172789573668991</c:v>
+                </c:pt>
+                <c:pt idx="3">
+                  <c:v>49.805609517627325</c:v>
                 </c:pt>
               </c:numCache>
             </c:numRef>
@@ -2598,13 +2602,13 @@
                 <c:formatCode>0.0000</c:formatCode>
                 <c:ptCount val="5"/>
                 <c:pt idx="0">
-                  <c:v>0.13618071873982998</c:v>
-                </c:pt>
-                <c:pt idx="1">
-                  <c:v>0.3729924837748233</c:v>
-                </c:pt>
-                <c:pt idx="2">
-                  <c:v>3.3767390039231997</c:v>
+                  <c:v>0.13618071873982995</c:v>
+                </c:pt>
+                <c:pt idx="1">
+                  <c:v>0.37299248377482341</c:v>
+                </c:pt>
+                <c:pt idx="2">
+                  <c:v>3.3767390039231993</c:v>
                 </c:pt>
                 <c:pt idx="3">
                   <c:v>31.319233465194333</c:v>
@@ -2637,24 +2641,24 @@
                   <c:v>0.11103753513760001</c:v>
                 </c:pt>
                 <c:pt idx="1">
-                  <c:v>0.39578368398878333</c:v>
-                </c:pt>
-                <c:pt idx="2">
-                  <c:v>3.5388888359070001</c:v>
-                </c:pt>
-                <c:pt idx="3">
-                  <c:v>33.837389787038333</c:v>
+                  <c:v>0.39578368398878344</c:v>
+                </c:pt>
+                <c:pt idx="2">
+                  <c:v>3.5388888359069997</c:v>
+                </c:pt>
+                <c:pt idx="3">
+                  <c:v>33.837389787038319</c:v>
                 </c:pt>
               </c:numCache>
             </c:numRef>
           </c:val>
         </c:ser>
         <c:marker val="1"/>
-        <c:axId val="96814592"/>
-        <c:axId val="96816512"/>
+        <c:axId val="71745536"/>
+        <c:axId val="71747456"/>
       </c:lineChart>
       <c:catAx>
-        <c:axId val="96814592"/>
+        <c:axId val="71745536"/>
         <c:scaling>
           <c:orientation val="minMax"/>
         </c:scaling>
@@ -2678,14 +2682,14 @@
           <c:layout/>
         </c:title>
         <c:tickLblPos val="nextTo"/>
-        <c:crossAx val="96816512"/>
+        <c:crossAx val="71747456"/>
         <c:crosses val="autoZero"/>
         <c:auto val="1"/>
         <c:lblAlgn val="ctr"/>
         <c:lblOffset val="100"/>
       </c:catAx>
       <c:valAx>
-        <c:axId val="96816512"/>
+        <c:axId val="71747456"/>
         <c:scaling>
           <c:orientation val="minMax"/>
         </c:scaling>
@@ -2711,7 +2715,7 @@
         </c:title>
         <c:numFmt formatCode="0.0000" sourceLinked="1"/>
         <c:tickLblPos val="nextTo"/>
-        <c:crossAx val="96814592"/>
+        <c:crossAx val="71745536"/>
         <c:crosses val="autoZero"/>
         <c:crossBetween val="between"/>
       </c:valAx>
@@ -2797,19 +2801,19 @@
                 <c:formatCode>0.0000</c:formatCode>
                 <c:ptCount val="5"/>
                 <c:pt idx="0">
-                  <c:v>3.3890167872111E-2</c:v>
-                </c:pt>
-                <c:pt idx="1">
-                  <c:v>0.10580190022786667</c:v>
-                </c:pt>
-                <c:pt idx="2">
-                  <c:v>1.7232122421264666</c:v>
+                  <c:v>3.3890167872111007E-2</c:v>
+                </c:pt>
+                <c:pt idx="1">
+                  <c:v>0.10580190022786666</c:v>
+                </c:pt>
+                <c:pt idx="2">
+                  <c:v>1.7232122421264664</c:v>
                 </c:pt>
                 <c:pt idx="3">
                   <c:v>10.497939666112002</c:v>
                 </c:pt>
                 <c:pt idx="4">
-                  <c:v>177.68513647715335</c:v>
+                  <c:v>177.68513647715341</c:v>
                 </c:pt>
               </c:numCache>
             </c:numRef>
@@ -2859,13 +2863,13 @@
                 <c:formatCode>0.0000</c:formatCode>
                 <c:ptCount val="5"/>
                 <c:pt idx="0">
-                  <c:v>0.20373706817627002</c:v>
+                  <c:v>0.20373706817627008</c:v>
                 </c:pt>
                 <c:pt idx="1">
                   <c:v>0.50053790410359666</c:v>
                 </c:pt>
                 <c:pt idx="2">
-                  <c:v>8.1107724666595331</c:v>
+                  <c:v>8.1107724666595313</c:v>
                 </c:pt>
                 <c:pt idx="3">
                   <c:v>46.192597770691009</c:v>
@@ -2921,16 +2925,16 @@
                 <c:formatCode>0.0000</c:formatCode>
                 <c:ptCount val="5"/>
                 <c:pt idx="0">
-                  <c:v>0.22649239699045998</c:v>
-                </c:pt>
-                <c:pt idx="1">
-                  <c:v>1.0004614591598533</c:v>
-                </c:pt>
-                <c:pt idx="2">
-                  <c:v>16.091394503911332</c:v>
-                </c:pt>
-                <c:pt idx="3">
-                  <c:v>92.304777256647682</c:v>
+                  <c:v>0.22649239699046</c:v>
+                </c:pt>
+                <c:pt idx="1">
+                  <c:v>1.0004614591598531</c:v>
+                </c:pt>
+                <c:pt idx="2">
+                  <c:v>16.091394503911328</c:v>
+                </c:pt>
+                <c:pt idx="3">
+                  <c:v>92.304777256647668</c:v>
                 </c:pt>
               </c:numCache>
             </c:numRef>
@@ -2980,27 +2984,27 @@
                 <c:formatCode>0.0000</c:formatCode>
                 <c:ptCount val="5"/>
                 <c:pt idx="0">
-                  <c:v>0.34732219378153334</c:v>
+                  <c:v>0.34732219378153339</c:v>
                 </c:pt>
                 <c:pt idx="1">
                   <c:v>1.5465638743506667</c:v>
                 </c:pt>
                 <c:pt idx="2">
-                  <c:v>23.651919153001668</c:v>
-                </c:pt>
-                <c:pt idx="3">
-                  <c:v>145.34041686588</c:v>
+                  <c:v>23.651919153001671</c:v>
+                </c:pt>
+                <c:pt idx="3">
+                  <c:v>145.34041686588003</c:v>
                 </c:pt>
               </c:numCache>
             </c:numRef>
           </c:val>
         </c:ser>
         <c:marker val="1"/>
-        <c:axId val="96601984"/>
-        <c:axId val="96608256"/>
+        <c:axId val="71787648"/>
+        <c:axId val="71789568"/>
       </c:lineChart>
       <c:catAx>
-        <c:axId val="96601984"/>
+        <c:axId val="71787648"/>
         <c:scaling>
           <c:orientation val="minMax"/>
         </c:scaling>
@@ -3024,14 +3028,14 @@
           <c:layout/>
         </c:title>
         <c:tickLblPos val="nextTo"/>
-        <c:crossAx val="96608256"/>
+        <c:crossAx val="71789568"/>
         <c:crosses val="autoZero"/>
         <c:auto val="1"/>
         <c:lblAlgn val="ctr"/>
         <c:lblOffset val="100"/>
       </c:catAx>
       <c:valAx>
-        <c:axId val="96608256"/>
+        <c:axId val="71789568"/>
         <c:scaling>
           <c:orientation val="minMax"/>
         </c:scaling>
@@ -3057,7 +3061,7 @@
         </c:title>
         <c:numFmt formatCode="0.0000" sourceLinked="1"/>
         <c:tickLblPos val="nextTo"/>
-        <c:crossAx val="96601984"/>
+        <c:crossAx val="71787648"/>
         <c:crosses val="autoZero"/>
         <c:crossBetween val="between"/>
       </c:valAx>
@@ -3146,13 +3150,13 @@
                   <c:v>0.21517356236775667</c:v>
                 </c:pt>
                 <c:pt idx="1">
-                  <c:v>0.39987309773762997</c:v>
+                  <c:v>0.39987309773763008</c:v>
                 </c:pt>
                 <c:pt idx="2">
                   <c:v>2.0393946965535665</c:v>
                 </c:pt>
                 <c:pt idx="3">
-                  <c:v>15.352367639541667</c:v>
+                  <c:v>15.35236763954167</c:v>
                 </c:pt>
                 <c:pt idx="4">
                   <c:v>196.75272377331999</c:v>
@@ -3205,16 +3209,16 @@
                 <c:formatCode>0.0000</c:formatCode>
                 <c:ptCount val="5"/>
                 <c:pt idx="0">
-                  <c:v>0.9503534634908033</c:v>
-                </c:pt>
-                <c:pt idx="1">
-                  <c:v>1.6178574244181334</c:v>
+                  <c:v>0.95035346349080341</c:v>
+                </c:pt>
+                <c:pt idx="1">
+                  <c:v>1.6178574244181338</c:v>
                 </c:pt>
                 <c:pt idx="2">
                   <c:v>8.3752527236938672</c:v>
                 </c:pt>
                 <c:pt idx="3">
-                  <c:v>67.272527726491333</c:v>
+                  <c:v>67.272527726491305</c:v>
                 </c:pt>
                 <c:pt idx="4">
                   <c:v>910.75101056098993</c:v>
@@ -3276,7 +3280,7 @@
                   <c:v>14.946233948071667</c:v>
                 </c:pt>
                 <c:pt idx="3">
-                  <c:v>128.15897695223336</c:v>
+                  <c:v>128.15897695223344</c:v>
                 </c:pt>
               </c:numCache>
             </c:numRef>
@@ -3332,7 +3336,7 @@
                   <c:v>4.2038242552015328</c:v>
                 </c:pt>
                 <c:pt idx="2">
-                  <c:v>26.22146465513433</c:v>
+                  <c:v>26.221464655134326</c:v>
                 </c:pt>
                 <c:pt idx="3">
                   <c:v>199.23809040917331</c:v>
@@ -3342,11 +3346,11 @@
           </c:val>
         </c:ser>
         <c:marker val="1"/>
-        <c:axId val="75945088"/>
-        <c:axId val="75954048"/>
+        <c:axId val="71837952"/>
+        <c:axId val="71848320"/>
       </c:lineChart>
       <c:catAx>
-        <c:axId val="75945088"/>
+        <c:axId val="71837952"/>
         <c:scaling>
           <c:orientation val="minMax"/>
         </c:scaling>
@@ -3370,14 +3374,14 @@
           <c:layout/>
         </c:title>
         <c:tickLblPos val="nextTo"/>
-        <c:crossAx val="75954048"/>
+        <c:crossAx val="71848320"/>
         <c:crosses val="autoZero"/>
         <c:auto val="1"/>
         <c:lblAlgn val="ctr"/>
         <c:lblOffset val="100"/>
       </c:catAx>
       <c:valAx>
-        <c:axId val="75954048"/>
+        <c:axId val="71848320"/>
         <c:scaling>
           <c:orientation val="minMax"/>
         </c:scaling>
@@ -3403,7 +3407,7 @@
         </c:title>
         <c:numFmt formatCode="0.0000" sourceLinked="1"/>
         <c:tickLblPos val="nextTo"/>
-        <c:crossAx val="75945088"/>
+        <c:crossAx val="71837952"/>
         <c:crosses val="autoZero"/>
         <c:crossBetween val="between"/>
       </c:valAx>
@@ -3503,13 +3507,13 @@
                   <c:v>0.12927309672037998</c:v>
                 </c:pt>
                 <c:pt idx="2">
-                  <c:v>1.4109907944997</c:v>
-                </c:pt>
-                <c:pt idx="3">
-                  <c:v>10.882926543553666</c:v>
+                  <c:v>1.4109907944996998</c:v>
+                </c:pt>
+                <c:pt idx="3">
+                  <c:v>10.882926543553667</c:v>
                 </c:pt>
                 <c:pt idx="4">
-                  <c:v>206.51538483301667</c:v>
+                  <c:v>206.51538483301664</c:v>
                 </c:pt>
               </c:numCache>
             </c:numRef>
@@ -3559,7 +3563,7 @@
                 <c:formatCode>0.0000</c:formatCode>
                 <c:ptCount val="5"/>
                 <c:pt idx="0">
-                  <c:v>0.12045116424560333</c:v>
+                  <c:v>0.12045116424560334</c:v>
                 </c:pt>
                 <c:pt idx="1">
                   <c:v>0.53469352722167995</c:v>
@@ -3568,10 +3572,10 @@
                   <c:v>5.3391131560007663</c:v>
                 </c:pt>
                 <c:pt idx="3">
-                  <c:v>46.38690835634867</c:v>
+                  <c:v>46.386908356348663</c:v>
                 </c:pt>
                 <c:pt idx="4">
-                  <c:v>897.97977868715998</c:v>
+                  <c:v>897.97977868716021</c:v>
                 </c:pt>
               </c:numCache>
             </c:numRef>
@@ -3621,16 +3625,16 @@
                 <c:formatCode>0.0000</c:formatCode>
                 <c:ptCount val="5"/>
                 <c:pt idx="0">
-                  <c:v>0.28729342619577997</c:v>
+                  <c:v>0.28729342619577991</c:v>
                 </c:pt>
                 <c:pt idx="1">
                   <c:v>0.96468755404154682</c:v>
                 </c:pt>
                 <c:pt idx="2">
-                  <c:v>10.400768963495866</c:v>
-                </c:pt>
-                <c:pt idx="3">
-                  <c:v>90.153725608189987</c:v>
+                  <c:v>10.400768963495864</c:v>
+                </c:pt>
+                <c:pt idx="3">
+                  <c:v>90.153725608189973</c:v>
                 </c:pt>
               </c:numCache>
             </c:numRef>
@@ -3680,27 +3684,27 @@
                 <c:formatCode>0.0000</c:formatCode>
                 <c:ptCount val="5"/>
                 <c:pt idx="0">
-                  <c:v>0.39436665640936996</c:v>
-                </c:pt>
-                <c:pt idx="1">
-                  <c:v>1.5496306896209668</c:v>
+                  <c:v>0.39436665640937002</c:v>
+                </c:pt>
+                <c:pt idx="1">
+                  <c:v>1.5496306896209666</c:v>
                 </c:pt>
                 <c:pt idx="2">
                   <c:v>15.945316065682334</c:v>
                 </c:pt>
                 <c:pt idx="3">
-                  <c:v>136.92019299930666</c:v>
+                  <c:v>136.92019299930664</c:v>
                 </c:pt>
               </c:numCache>
             </c:numRef>
           </c:val>
         </c:ser>
         <c:marker val="1"/>
-        <c:axId val="97116160"/>
-        <c:axId val="98873344"/>
+        <c:axId val="71863680"/>
+        <c:axId val="71906816"/>
       </c:lineChart>
       <c:catAx>
-        <c:axId val="97116160"/>
+        <c:axId val="71863680"/>
         <c:scaling>
           <c:orientation val="minMax"/>
         </c:scaling>
@@ -3724,14 +3728,14 @@
           <c:layout/>
         </c:title>
         <c:tickLblPos val="nextTo"/>
-        <c:crossAx val="98873344"/>
+        <c:crossAx val="71906816"/>
         <c:crosses val="autoZero"/>
         <c:auto val="1"/>
         <c:lblAlgn val="ctr"/>
         <c:lblOffset val="100"/>
       </c:catAx>
       <c:valAx>
-        <c:axId val="98873344"/>
+        <c:axId val="71906816"/>
         <c:scaling>
           <c:orientation val="minMax"/>
         </c:scaling>
@@ -3757,7 +3761,7 @@
         </c:title>
         <c:numFmt formatCode="0.0000" sourceLinked="1"/>
         <c:tickLblPos val="nextTo"/>
-        <c:crossAx val="97116160"/>
+        <c:crossAx val="71863680"/>
         <c:crosses val="autoZero"/>
         <c:crossBetween val="between"/>
       </c:valAx>
@@ -3843,19 +3847,19 @@
                 <c:formatCode>0.0000</c:formatCode>
                 <c:ptCount val="5"/>
                 <c:pt idx="0">
-                  <c:v>1.0758678118387667E-2</c:v>
-                </c:pt>
-                <c:pt idx="1">
-                  <c:v>1.9993654886881332E-2</c:v>
-                </c:pt>
-                <c:pt idx="2">
-                  <c:v>0.10196973482768001</c:v>
+                  <c:v>1.0758678118387668E-2</c:v>
+                </c:pt>
+                <c:pt idx="1">
+                  <c:v>1.9993654886881335E-2</c:v>
+                </c:pt>
+                <c:pt idx="2">
+                  <c:v>0.10196973482768003</c:v>
                 </c:pt>
                 <c:pt idx="3">
                   <c:v>0.76761838197708332</c:v>
                 </c:pt>
                 <c:pt idx="4">
-                  <c:v>9.8376361886660657</c:v>
+                  <c:v>9.8376361886660675</c:v>
                 </c:pt>
               </c:numCache>
             </c:numRef>
@@ -3905,13 +3909,13 @@
                 <c:formatCode>0.0000</c:formatCode>
                 <c:ptCount val="5"/>
                 <c:pt idx="0">
-                  <c:v>4.7517673174540663E-2</c:v>
+                  <c:v>4.7517673174540684E-2</c:v>
                 </c:pt>
                 <c:pt idx="1">
                   <c:v>8.0892871220906992E-2</c:v>
                 </c:pt>
                 <c:pt idx="2">
-                  <c:v>0.41876263618469328</c:v>
+                  <c:v>0.41876263618469334</c:v>
                 </c:pt>
                 <c:pt idx="3">
                   <c:v>3.3636263863245994</c:v>
@@ -3970,10 +3974,10 @@
                   <c:v>9.6716419458389005E-2</c:v>
                 </c:pt>
                 <c:pt idx="1">
-                  <c:v>0.14485155582427667</c:v>
-                </c:pt>
-                <c:pt idx="2">
-                  <c:v>0.74731169740358994</c:v>
+                  <c:v>0.1448515558242767</c:v>
+                </c:pt>
+                <c:pt idx="2">
+                  <c:v>0.74731169740359016</c:v>
                 </c:pt>
                 <c:pt idx="3">
                   <c:v>6.4079488476117668</c:v>
@@ -4026,10 +4030,10 @@
                 <c:formatCode>0.0000</c:formatCode>
                 <c:ptCount val="5"/>
                 <c:pt idx="0">
-                  <c:v>0.14001714150110667</c:v>
-                </c:pt>
-                <c:pt idx="1">
-                  <c:v>0.21019121276007668</c:v>
+                  <c:v>0.14001714150110675</c:v>
+                </c:pt>
+                <c:pt idx="1">
+                  <c:v>0.21019121276007671</c:v>
                 </c:pt>
                 <c:pt idx="2">
                   <c:v>1.3110732327567001</c:v>
@@ -4042,11 +4046,11 @@
           </c:val>
         </c:ser>
         <c:marker val="1"/>
-        <c:axId val="99469184"/>
-        <c:axId val="99480320"/>
+        <c:axId val="67292160"/>
+        <c:axId val="68633728"/>
       </c:lineChart>
       <c:catAx>
-        <c:axId val="99469184"/>
+        <c:axId val="67292160"/>
         <c:scaling>
           <c:orientation val="minMax"/>
         </c:scaling>
@@ -4070,14 +4074,14 @@
           <c:layout/>
         </c:title>
         <c:tickLblPos val="nextTo"/>
-        <c:crossAx val="99480320"/>
+        <c:crossAx val="68633728"/>
         <c:crosses val="autoZero"/>
         <c:auto val="1"/>
         <c:lblAlgn val="ctr"/>
         <c:lblOffset val="100"/>
       </c:catAx>
       <c:valAx>
-        <c:axId val="99480320"/>
+        <c:axId val="68633728"/>
         <c:scaling>
           <c:orientation val="minMax"/>
         </c:scaling>
@@ -4103,7 +4107,7 @@
         </c:title>
         <c:numFmt formatCode="0.0000" sourceLinked="1"/>
         <c:tickLblPos val="nextTo"/>
-        <c:crossAx val="99469184"/>
+        <c:crossAx val="67292160"/>
         <c:crosses val="autoZero"/>
         <c:crossBetween val="between"/>
       </c:valAx>
@@ -4197,19 +4201,19 @@
                 <c:formatCode>0.0000</c:formatCode>
                 <c:ptCount val="5"/>
                 <c:pt idx="0">
-                  <c:v>3.9963245391845668E-2</c:v>
+                  <c:v>3.9963245391845675E-2</c:v>
                 </c:pt>
                 <c:pt idx="1">
                   <c:v>0.12753566106160333</c:v>
                 </c:pt>
                 <c:pt idx="2">
-                  <c:v>1.6529564062754334</c:v>
-                </c:pt>
-                <c:pt idx="3">
-                  <c:v>11.212735652923667</c:v>
+                  <c:v>1.6529564062754336</c:v>
+                </c:pt>
+                <c:pt idx="3">
+                  <c:v>11.212735652923669</c:v>
                 </c:pt>
                 <c:pt idx="4">
-                  <c:v>195.02278296152667</c:v>
+                  <c:v>195.02278296152664</c:v>
                 </c:pt>
               </c:numCache>
             </c:numRef>
@@ -4259,16 +4263,16 @@
                 <c:formatCode>0.0000</c:formatCode>
                 <c:ptCount val="5"/>
                 <c:pt idx="0">
-                  <c:v>0.12258480389912667</c:v>
+                  <c:v>0.12258480389912665</c:v>
                 </c:pt>
                 <c:pt idx="1">
                   <c:v>0.57089724540710662</c:v>
                 </c:pt>
                 <c:pt idx="2">
-                  <c:v>5.9301956653594994</c:v>
-                </c:pt>
-                <c:pt idx="3">
-                  <c:v>45.660936991374001</c:v>
+                  <c:v>5.9301956653594985</c:v>
+                </c:pt>
+                <c:pt idx="3">
+                  <c:v>45.660936991374008</c:v>
                 </c:pt>
                 <c:pt idx="4">
                   <c:v>895.42207113901998</c:v>
@@ -4321,16 +4325,16 @@
                 <c:formatCode>0.0000</c:formatCode>
                 <c:ptCount val="5"/>
                 <c:pt idx="0">
-                  <c:v>0.24431110223134334</c:v>
-                </c:pt>
-                <c:pt idx="1">
-                  <c:v>1.1292680263519232</c:v>
-                </c:pt>
-                <c:pt idx="2">
-                  <c:v>11.410607790946665</c:v>
-                </c:pt>
-                <c:pt idx="3">
-                  <c:v>92.200532698631335</c:v>
+                  <c:v>0.24431110223134336</c:v>
+                </c:pt>
+                <c:pt idx="1">
+                  <c:v>1.1292680263519235</c:v>
+                </c:pt>
+                <c:pt idx="2">
+                  <c:v>11.410607790946667</c:v>
+                </c:pt>
+                <c:pt idx="3">
+                  <c:v>92.200532698631321</c:v>
                 </c:pt>
               </c:numCache>
             </c:numRef>
@@ -4380,27 +4384,27 @@
                 <c:formatCode>0.0000</c:formatCode>
                 <c:ptCount val="5"/>
                 <c:pt idx="0">
-                  <c:v>0.36700509919060997</c:v>
-                </c:pt>
-                <c:pt idx="1">
-                  <c:v>1.5181349065568668</c:v>
-                </c:pt>
-                <c:pt idx="2">
-                  <c:v>15.922053533130333</c:v>
-                </c:pt>
-                <c:pt idx="3">
-                  <c:v>140.12017811669332</c:v>
+                  <c:v>0.36700509919061003</c:v>
+                </c:pt>
+                <c:pt idx="1">
+                  <c:v>1.518134906556867</c:v>
+                </c:pt>
+                <c:pt idx="2">
+                  <c:v>15.922053533130335</c:v>
+                </c:pt>
+                <c:pt idx="3">
+                  <c:v>140.12017811669338</c:v>
                 </c:pt>
               </c:numCache>
             </c:numRef>
           </c:val>
         </c:ser>
         <c:marker val="1"/>
-        <c:axId val="79393920"/>
-        <c:axId val="79396224"/>
+        <c:axId val="71947008"/>
+        <c:axId val="71948928"/>
       </c:lineChart>
       <c:catAx>
-        <c:axId val="79393920"/>
+        <c:axId val="71947008"/>
         <c:scaling>
           <c:orientation val="minMax"/>
         </c:scaling>
@@ -4424,14 +4428,14 @@
           <c:layout/>
         </c:title>
         <c:tickLblPos val="nextTo"/>
-        <c:crossAx val="79396224"/>
+        <c:crossAx val="71948928"/>
         <c:crosses val="autoZero"/>
         <c:auto val="1"/>
         <c:lblAlgn val="ctr"/>
         <c:lblOffset val="100"/>
       </c:catAx>
       <c:valAx>
-        <c:axId val="79396224"/>
+        <c:axId val="71948928"/>
         <c:scaling>
           <c:orientation val="minMax"/>
         </c:scaling>
@@ -4457,7 +4461,7 @@
         </c:title>
         <c:numFmt formatCode="0.0000" sourceLinked="1"/>
         <c:tickLblPos val="nextTo"/>
-        <c:crossAx val="79393920"/>
+        <c:crossAx val="71947008"/>
         <c:crosses val="autoZero"/>
         <c:crossBetween val="between"/>
       </c:valAx>
@@ -4542,19 +4546,19 @@
                 <c:formatCode>0.0000</c:formatCode>
                 <c:ptCount val="5"/>
                 <c:pt idx="0">
-                  <c:v>3.3890167872111E-2</c:v>
-                </c:pt>
-                <c:pt idx="1">
-                  <c:v>0.10580190022786667</c:v>
-                </c:pt>
-                <c:pt idx="2">
-                  <c:v>1.7232122421264666</c:v>
+                  <c:v>3.3890167872111007E-2</c:v>
+                </c:pt>
+                <c:pt idx="1">
+                  <c:v>0.10580190022786666</c:v>
+                </c:pt>
+                <c:pt idx="2">
+                  <c:v>1.7232122421264664</c:v>
                 </c:pt>
                 <c:pt idx="3">
                   <c:v>10.497939666112002</c:v>
                 </c:pt>
                 <c:pt idx="4">
-                  <c:v>177.68513647715335</c:v>
+                  <c:v>177.68513647715341</c:v>
                 </c:pt>
               </c:numCache>
             </c:numRef>
@@ -4607,13 +4611,13 @@
                   <c:v>0.21517356236775667</c:v>
                 </c:pt>
                 <c:pt idx="1">
-                  <c:v>0.39987309773762997</c:v>
+                  <c:v>0.39987309773763008</c:v>
                 </c:pt>
                 <c:pt idx="2">
                   <c:v>2.0393946965535665</c:v>
                 </c:pt>
                 <c:pt idx="3">
-                  <c:v>15.352367639541667</c:v>
+                  <c:v>15.35236763954167</c:v>
                 </c:pt>
                 <c:pt idx="4">
                   <c:v>196.75272377331999</c:v>
@@ -4649,13 +4653,13 @@
                   <c:v>0.12927309672037998</c:v>
                 </c:pt>
                 <c:pt idx="2">
-                  <c:v>1.4109907944997</c:v>
-                </c:pt>
-                <c:pt idx="3">
-                  <c:v>10.882926543553666</c:v>
+                  <c:v>1.4109907944996998</c:v>
+                </c:pt>
+                <c:pt idx="3">
+                  <c:v>10.882926543553667</c:v>
                 </c:pt>
                 <c:pt idx="4">
-                  <c:v>206.51538483301667</c:v>
+                  <c:v>206.51538483301664</c:v>
                 </c:pt>
               </c:numCache>
             </c:numRef>
@@ -4682,30 +4686,30 @@
                 <c:formatCode>0.0000</c:formatCode>
                 <c:ptCount val="5"/>
                 <c:pt idx="0">
-                  <c:v>3.9963245391845668E-2</c:v>
+                  <c:v>3.9963245391845675E-2</c:v>
                 </c:pt>
                 <c:pt idx="1">
                   <c:v>0.12753566106160333</c:v>
                 </c:pt>
                 <c:pt idx="2">
-                  <c:v>1.6529564062754334</c:v>
-                </c:pt>
-                <c:pt idx="3">
-                  <c:v>11.212735652923667</c:v>
+                  <c:v>1.6529564062754336</c:v>
+                </c:pt>
+                <c:pt idx="3">
+                  <c:v>11.212735652923669</c:v>
                 </c:pt>
                 <c:pt idx="4">
-                  <c:v>195.02278296152667</c:v>
+                  <c:v>195.02278296152664</c:v>
                 </c:pt>
               </c:numCache>
             </c:numRef>
           </c:val>
         </c:ser>
         <c:marker val="1"/>
-        <c:axId val="79393152"/>
-        <c:axId val="79414784"/>
+        <c:axId val="72259456"/>
+        <c:axId val="72273920"/>
       </c:lineChart>
       <c:catAx>
-        <c:axId val="79393152"/>
+        <c:axId val="72259456"/>
         <c:scaling>
           <c:orientation val="minMax"/>
         </c:scaling>
@@ -4729,14 +4733,14 @@
           <c:layout/>
         </c:title>
         <c:tickLblPos val="nextTo"/>
-        <c:crossAx val="79414784"/>
+        <c:crossAx val="72273920"/>
         <c:crosses val="autoZero"/>
         <c:auto val="1"/>
         <c:lblAlgn val="ctr"/>
         <c:lblOffset val="100"/>
       </c:catAx>
       <c:valAx>
-        <c:axId val="79414784"/>
+        <c:axId val="72273920"/>
         <c:scaling>
           <c:orientation val="minMax"/>
         </c:scaling>
@@ -4762,7 +4766,7 @@
         </c:title>
         <c:numFmt formatCode="0.0000" sourceLinked="1"/>
         <c:tickLblPos val="nextTo"/>
-        <c:crossAx val="79393152"/>
+        <c:crossAx val="72259456"/>
         <c:crosses val="autoZero"/>
         <c:crossBetween val="between"/>
       </c:valAx>
@@ -4808,7 +4812,7 @@
           <c:order val="0"/>
           <c:tx>
             <c:strRef>
-              <c:f>Máximas!$A$3</c:f>
+              <c:f>Totais!$A$3</c:f>
               <c:strCache>
                 <c:ptCount val="1"/>
                 <c:pt idx="0">
@@ -4842,24 +4846,24 @@
           </c:cat>
           <c:val>
             <c:numRef>
-              <c:f>Máximas!$J$3:$J$7</c:f>
+              <c:f>Totais!$J$3:$J$7</c:f>
               <c:numCache>
                 <c:formatCode>0.0000</c:formatCode>
                 <c:ptCount val="5"/>
                 <c:pt idx="0">
-                  <c:v>0.115225156148275</c:v>
-                </c:pt>
-                <c:pt idx="1">
-                  <c:v>0.11600995063781666</c:v>
-                </c:pt>
-                <c:pt idx="2">
-                  <c:v>1.7640364964803332</c:v>
-                </c:pt>
-                <c:pt idx="3">
-                  <c:v>10.2913300991056</c:v>
+                  <c:v>0.20373706817627002</c:v>
+                </c:pt>
+                <c:pt idx="1">
+                  <c:v>0.50053790410359666</c:v>
+                </c:pt>
+                <c:pt idx="2">
+                  <c:v>8.1107724666595331</c:v>
+                </c:pt>
+                <c:pt idx="3">
+                  <c:v>46.192597770691009</c:v>
                 </c:pt>
                 <c:pt idx="4">
-                  <c:v>162.72489585876667</c:v>
+                  <c:v>789.86907316843656</c:v>
                 </c:pt>
               </c:numCache>
             </c:numRef>
@@ -4870,7 +4874,7 @@
           <c:order val="1"/>
           <c:tx>
             <c:strRef>
-              <c:f>Máximas!$A$9</c:f>
+              <c:f>Totais!$A$9</c:f>
               <c:strCache>
                 <c:ptCount val="1"/>
                 <c:pt idx="0">
@@ -4904,24 +4908,24 @@
           </c:cat>
           <c:val>
             <c:numRef>
-              <c:f>Máximas!$J$9:$J$13</c:f>
+              <c:f>Totais!$J$9:$J$13</c:f>
               <c:numCache>
                 <c:formatCode>0.0000</c:formatCode>
                 <c:ptCount val="5"/>
                 <c:pt idx="0">
-                  <c:v>0.20418125788370667</c:v>
-                </c:pt>
-                <c:pt idx="1">
-                  <c:v>0.37549309730529662</c:v>
-                </c:pt>
-                <c:pt idx="2">
-                  <c:v>1.8550400892893333</c:v>
-                </c:pt>
-                <c:pt idx="3">
-                  <c:v>16.794017903010332</c:v>
+                  <c:v>0.9503534634908033</c:v>
+                </c:pt>
+                <c:pt idx="1">
+                  <c:v>1.6178574244181334</c:v>
+                </c:pt>
+                <c:pt idx="2">
+                  <c:v>8.3752527236938672</c:v>
+                </c:pt>
+                <c:pt idx="3">
+                  <c:v>67.272527726491333</c:v>
                 </c:pt>
                 <c:pt idx="4">
-                  <c:v>206.55737091700666</c:v>
+                  <c:v>910.75101056098993</c:v>
                 </c:pt>
               </c:numCache>
             </c:numRef>
@@ -4932,7 +4936,7 @@
           <c:order val="2"/>
           <c:tx>
             <c:strRef>
-              <c:f>Máximas!$A$15:$A$16</c:f>
+              <c:f>Totais!$A$15:$A$16</c:f>
               <c:strCache>
                 <c:ptCount val="1"/>
                 <c:pt idx="0">
@@ -4943,24 +4947,24 @@
           </c:tx>
           <c:val>
             <c:numRef>
-              <c:f>Máximas!$J$15:$J$19</c:f>
+              <c:f>Totais!$J$15:$J$19</c:f>
               <c:numCache>
                 <c:formatCode>0.0000</c:formatCode>
                 <c:ptCount val="5"/>
                 <c:pt idx="0">
-                  <c:v>3.7217839558919337E-2</c:v>
-                </c:pt>
-                <c:pt idx="1">
-                  <c:v>0.13084851900736336</c:v>
-                </c:pt>
-                <c:pt idx="2">
-                  <c:v>1.1538695494333668</c:v>
-                </c:pt>
-                <c:pt idx="3">
-                  <c:v>11.289022588729999</c:v>
+                  <c:v>0.12045116424560333</c:v>
+                </c:pt>
+                <c:pt idx="1">
+                  <c:v>0.53469352722167995</c:v>
+                </c:pt>
+                <c:pt idx="2">
+                  <c:v>5.3391131560007663</c:v>
+                </c:pt>
+                <c:pt idx="3">
+                  <c:v>46.38690835634867</c:v>
                 </c:pt>
                 <c:pt idx="4">
-                  <c:v>197.50086808204665</c:v>
+                  <c:v>897.97977868715998</c:v>
                 </c:pt>
               </c:numCache>
             </c:numRef>
@@ -4971,7 +4975,7 @@
           <c:order val="3"/>
           <c:tx>
             <c:strRef>
-              <c:f>Máximas!$A$21:$A$22</c:f>
+              <c:f>Totais!$A$21:$A$22</c:f>
               <c:strCache>
                 <c:ptCount val="1"/>
                 <c:pt idx="0">
@@ -4982,35 +4986,35 @@
           </c:tx>
           <c:val>
             <c:numRef>
-              <c:f>Máximas!$J$21:$J$25</c:f>
+              <c:f>Totais!$J$21:$J$25</c:f>
               <c:numCache>
                 <c:formatCode>0.0000</c:formatCode>
                 <c:ptCount val="5"/>
                 <c:pt idx="0">
-                  <c:v>3.4685961405435999E-2</c:v>
-                </c:pt>
-                <c:pt idx="1">
-                  <c:v>0.14406822522481336</c:v>
-                </c:pt>
-                <c:pt idx="2">
-                  <c:v>1.3146018664041998</c:v>
-                </c:pt>
-                <c:pt idx="3">
-                  <c:v>11.210631418228333</c:v>
+                  <c:v>0.12258480389912667</c:v>
+                </c:pt>
+                <c:pt idx="1">
+                  <c:v>0.57089724540710662</c:v>
+                </c:pt>
+                <c:pt idx="2">
+                  <c:v>5.9301956653594994</c:v>
+                </c:pt>
+                <c:pt idx="3">
+                  <c:v>45.660936991374001</c:v>
                 </c:pt>
                 <c:pt idx="4">
-                  <c:v>205.52975365320665</c:v>
+                  <c:v>895.42207113901998</c:v>
                 </c:pt>
               </c:numCache>
             </c:numRef>
           </c:val>
         </c:ser>
         <c:marker val="1"/>
-        <c:axId val="99483008"/>
-        <c:axId val="99932032"/>
+        <c:axId val="99173120"/>
+        <c:axId val="99398016"/>
       </c:lineChart>
       <c:catAx>
-        <c:axId val="99483008"/>
+        <c:axId val="99173120"/>
         <c:scaling>
           <c:orientation val="minMax"/>
         </c:scaling>
@@ -5034,14 +5038,14 @@
           <c:layout/>
         </c:title>
         <c:tickLblPos val="nextTo"/>
-        <c:crossAx val="99932032"/>
+        <c:crossAx val="99398016"/>
         <c:crosses val="autoZero"/>
         <c:auto val="1"/>
         <c:lblAlgn val="ctr"/>
         <c:lblOffset val="100"/>
       </c:catAx>
       <c:valAx>
-        <c:axId val="99932032"/>
+        <c:axId val="99398016"/>
         <c:scaling>
           <c:orientation val="minMax"/>
         </c:scaling>
@@ -5067,7 +5071,7 @@
         </c:title>
         <c:numFmt formatCode="0.0000" sourceLinked="1"/>
         <c:tickLblPos val="nextTo"/>
-        <c:crossAx val="99483008"/>
+        <c:crossAx val="99173120"/>
         <c:crosses val="autoZero"/>
         <c:crossBetween val="between"/>
       </c:valAx>
@@ -5152,16 +5156,16 @@
                 <c:formatCode>0.0000</c:formatCode>
                 <c:ptCount val="5"/>
                 <c:pt idx="0">
-                  <c:v>0.22649239699045998</c:v>
-                </c:pt>
-                <c:pt idx="1">
-                  <c:v>1.0004614591598533</c:v>
-                </c:pt>
-                <c:pt idx="2">
-                  <c:v>16.091394503911332</c:v>
-                </c:pt>
-                <c:pt idx="3">
-                  <c:v>92.304777256647682</c:v>
+                  <c:v>0.22649239699046</c:v>
+                </c:pt>
+                <c:pt idx="1">
+                  <c:v>1.0004614591598531</c:v>
+                </c:pt>
+                <c:pt idx="2">
+                  <c:v>16.091394503911328</c:v>
+                </c:pt>
+                <c:pt idx="3">
+                  <c:v>92.304777256647668</c:v>
                 </c:pt>
               </c:numCache>
             </c:numRef>
@@ -5220,7 +5224,7 @@
                   <c:v>14.946233948071667</c:v>
                 </c:pt>
                 <c:pt idx="3">
-                  <c:v>128.15897695223336</c:v>
+                  <c:v>128.15897695223344</c:v>
                 </c:pt>
               </c:numCache>
             </c:numRef>
@@ -5247,16 +5251,16 @@
                 <c:formatCode>0.0000</c:formatCode>
                 <c:ptCount val="5"/>
                 <c:pt idx="0">
-                  <c:v>0.28729342619577997</c:v>
+                  <c:v>0.28729342619577991</c:v>
                 </c:pt>
                 <c:pt idx="1">
                   <c:v>0.96468755404154682</c:v>
                 </c:pt>
                 <c:pt idx="2">
-                  <c:v>10.400768963495866</c:v>
-                </c:pt>
-                <c:pt idx="3">
-                  <c:v>90.153725608189987</c:v>
+                  <c:v>10.400768963495864</c:v>
+                </c:pt>
+                <c:pt idx="3">
+                  <c:v>90.153725608189973</c:v>
                 </c:pt>
               </c:numCache>
             </c:numRef>
@@ -5283,27 +5287,27 @@
                 <c:formatCode>0.0000</c:formatCode>
                 <c:ptCount val="5"/>
                 <c:pt idx="0">
-                  <c:v>0.24431110223134334</c:v>
-                </c:pt>
-                <c:pt idx="1">
-                  <c:v>1.1292680263519232</c:v>
-                </c:pt>
-                <c:pt idx="2">
-                  <c:v>11.410607790946665</c:v>
-                </c:pt>
-                <c:pt idx="3">
-                  <c:v>92.200532698631335</c:v>
+                  <c:v>0.24431110223134336</c:v>
+                </c:pt>
+                <c:pt idx="1">
+                  <c:v>1.1292680263519235</c:v>
+                </c:pt>
+                <c:pt idx="2">
+                  <c:v>11.410607790946667</c:v>
+                </c:pt>
+                <c:pt idx="3">
+                  <c:v>92.200532698631321</c:v>
                 </c:pt>
               </c:numCache>
             </c:numRef>
           </c:val>
         </c:ser>
         <c:marker val="1"/>
-        <c:axId val="94828032"/>
-        <c:axId val="96465280"/>
+        <c:axId val="72393088"/>
+        <c:axId val="72395008"/>
       </c:lineChart>
       <c:catAx>
-        <c:axId val="94828032"/>
+        <c:axId val="72393088"/>
         <c:scaling>
           <c:orientation val="minMax"/>
         </c:scaling>
@@ -5327,14 +5331,14 @@
           <c:layout/>
         </c:title>
         <c:tickLblPos val="nextTo"/>
-        <c:crossAx val="96465280"/>
+        <c:crossAx val="72395008"/>
         <c:crosses val="autoZero"/>
         <c:auto val="1"/>
         <c:lblAlgn val="ctr"/>
         <c:lblOffset val="100"/>
       </c:catAx>
       <c:valAx>
-        <c:axId val="96465280"/>
+        <c:axId val="72395008"/>
         <c:scaling>
           <c:orientation val="minMax"/>
         </c:scaling>
@@ -5360,7 +5364,7 @@
         </c:title>
         <c:numFmt formatCode="0.0000" sourceLinked="1"/>
         <c:tickLblPos val="nextTo"/>
-        <c:crossAx val="94828032"/>
+        <c:crossAx val="72393088"/>
         <c:crosses val="autoZero"/>
         <c:crossBetween val="between"/>
       </c:valAx>
@@ -5445,16 +5449,16 @@
                 <c:formatCode>0.0000</c:formatCode>
                 <c:ptCount val="5"/>
                 <c:pt idx="0">
-                  <c:v>0.34732219378153334</c:v>
+                  <c:v>0.34732219378153339</c:v>
                 </c:pt>
                 <c:pt idx="1">
                   <c:v>1.5465638743506667</c:v>
                 </c:pt>
                 <c:pt idx="2">
-                  <c:v>23.651919153001668</c:v>
-                </c:pt>
-                <c:pt idx="3">
-                  <c:v>145.34041686588</c:v>
+                  <c:v>23.651919153001671</c:v>
+                </c:pt>
+                <c:pt idx="3">
+                  <c:v>145.34041686588003</c:v>
                 </c:pt>
               </c:numCache>
             </c:numRef>
@@ -5510,7 +5514,7 @@
                   <c:v>4.2038242552015328</c:v>
                 </c:pt>
                 <c:pt idx="2">
-                  <c:v>26.22146465513433</c:v>
+                  <c:v>26.221464655134326</c:v>
                 </c:pt>
                 <c:pt idx="3">
                   <c:v>199.23809040917331</c:v>
@@ -5540,16 +5544,16 @@
                 <c:formatCode>0.0000</c:formatCode>
                 <c:ptCount val="5"/>
                 <c:pt idx="0">
-                  <c:v>0.39436665640936996</c:v>
-                </c:pt>
-                <c:pt idx="1">
-                  <c:v>1.5496306896209668</c:v>
+                  <c:v>0.39436665640937002</c:v>
+                </c:pt>
+                <c:pt idx="1">
+                  <c:v>1.5496306896209666</c:v>
                 </c:pt>
                 <c:pt idx="2">
                   <c:v>15.945316065682334</c:v>
                 </c:pt>
                 <c:pt idx="3">
-                  <c:v>136.92019299930666</c:v>
+                  <c:v>136.92019299930664</c:v>
                 </c:pt>
               </c:numCache>
             </c:numRef>
@@ -5576,27 +5580,27 @@
                 <c:formatCode>0.0000</c:formatCode>
                 <c:ptCount val="5"/>
                 <c:pt idx="0">
-                  <c:v>0.36700509919060997</c:v>
-                </c:pt>
-                <c:pt idx="1">
-                  <c:v>1.5181349065568668</c:v>
-                </c:pt>
-                <c:pt idx="2">
-                  <c:v>15.922053533130333</c:v>
-                </c:pt>
-                <c:pt idx="3">
-                  <c:v>140.12017811669332</c:v>
+                  <c:v>0.36700509919061003</c:v>
+                </c:pt>
+                <c:pt idx="1">
+                  <c:v>1.518134906556867</c:v>
+                </c:pt>
+                <c:pt idx="2">
+                  <c:v>15.922053533130335</c:v>
+                </c:pt>
+                <c:pt idx="3">
+                  <c:v>140.12017811669338</c:v>
                 </c:pt>
               </c:numCache>
             </c:numRef>
           </c:val>
         </c:ser>
         <c:marker val="1"/>
-        <c:axId val="97018240"/>
-        <c:axId val="97020544"/>
+        <c:axId val="73541120"/>
+        <c:axId val="73543040"/>
       </c:lineChart>
       <c:catAx>
-        <c:axId val="97018240"/>
+        <c:axId val="73541120"/>
         <c:scaling>
           <c:orientation val="minMax"/>
         </c:scaling>
@@ -5620,14 +5624,14 @@
           <c:layout/>
         </c:title>
         <c:tickLblPos val="nextTo"/>
-        <c:crossAx val="97020544"/>
+        <c:crossAx val="73543040"/>
         <c:crosses val="autoZero"/>
         <c:auto val="1"/>
         <c:lblAlgn val="ctr"/>
         <c:lblOffset val="100"/>
       </c:catAx>
       <c:valAx>
-        <c:axId val="97020544"/>
+        <c:axId val="73543040"/>
         <c:scaling>
           <c:orientation val="minMax"/>
         </c:scaling>
@@ -5653,7 +5657,7 @@
         </c:title>
         <c:numFmt formatCode="0.0000" sourceLinked="1"/>
         <c:tickLblPos val="nextTo"/>
-        <c:crossAx val="97018240"/>
+        <c:crossAx val="73541120"/>
         <c:crosses val="autoZero"/>
         <c:crossBetween val="between"/>
       </c:valAx>
@@ -5812,7 +5816,7 @@
                   <c:v>6.0225582122802671E-3</c:v>
                 </c:pt>
                 <c:pt idx="1">
-                  <c:v>2.6734676361084331E-2</c:v>
+                  <c:v>2.6734676361084335E-2</c:v>
                 </c:pt>
                 <c:pt idx="2">
                   <c:v>0.26695565780003999</c:v>
@@ -5821,7 +5825,7 @@
                   <c:v>2.3193454178174333</c:v>
                 </c:pt>
                 <c:pt idx="4">
-                  <c:v>44.898988934357995</c:v>
+                  <c:v>44.898988934358009</c:v>
                 </c:pt>
               </c:numCache>
             </c:numRef>
@@ -5871,16 +5875,16 @@
                 <c:formatCode>0.0000</c:formatCode>
                 <c:ptCount val="5"/>
                 <c:pt idx="0">
-                  <c:v>1.4364671309789001E-2</c:v>
-                </c:pt>
-                <c:pt idx="1">
-                  <c:v>4.8234377702077336E-2</c:v>
+                  <c:v>1.4364671309789002E-2</c:v>
+                </c:pt>
+                <c:pt idx="1">
+                  <c:v>4.8234377702077329E-2</c:v>
                 </c:pt>
                 <c:pt idx="2">
                   <c:v>0.52003844817479672</c:v>
                 </c:pt>
                 <c:pt idx="3">
-                  <c:v>4.5076862804094997</c:v>
+                  <c:v>4.5076862804094988</c:v>
                 </c:pt>
               </c:numCache>
             </c:numRef>
@@ -5930,27 +5934,27 @@
                 <c:formatCode>0.0000</c:formatCode>
                 <c:ptCount val="5"/>
                 <c:pt idx="0">
-                  <c:v>1.9718332820468334E-2</c:v>
-                </c:pt>
-                <c:pt idx="1">
-                  <c:v>7.7481534481048664E-2</c:v>
-                </c:pt>
-                <c:pt idx="2">
-                  <c:v>0.79726580328411334</c:v>
-                </c:pt>
-                <c:pt idx="3">
-                  <c:v>6.8460096499654997</c:v>
+                  <c:v>1.9718332820468337E-2</c:v>
+                </c:pt>
+                <c:pt idx="1">
+                  <c:v>7.7481534481048678E-2</c:v>
+                </c:pt>
+                <c:pt idx="2">
+                  <c:v>0.79726580328411345</c:v>
+                </c:pt>
+                <c:pt idx="3">
+                  <c:v>6.8460096499654988</c:v>
                 </c:pt>
               </c:numCache>
             </c:numRef>
           </c:val>
         </c:ser>
         <c:marker val="1"/>
-        <c:axId val="81065856"/>
-        <c:axId val="94229248"/>
+        <c:axId val="68665728"/>
+        <c:axId val="68667648"/>
       </c:lineChart>
       <c:catAx>
-        <c:axId val="81065856"/>
+        <c:axId val="68665728"/>
         <c:scaling>
           <c:orientation val="minMax"/>
         </c:scaling>
@@ -5974,14 +5978,14 @@
           <c:layout/>
         </c:title>
         <c:tickLblPos val="nextTo"/>
-        <c:crossAx val="94229248"/>
+        <c:crossAx val="68667648"/>
         <c:crosses val="autoZero"/>
         <c:auto val="1"/>
         <c:lblAlgn val="ctr"/>
         <c:lblOffset val="100"/>
       </c:catAx>
       <c:valAx>
-        <c:axId val="94229248"/>
+        <c:axId val="68667648"/>
         <c:scaling>
           <c:orientation val="minMax"/>
         </c:scaling>
@@ -6007,7 +6011,7 @@
         </c:title>
         <c:numFmt formatCode="0.0000" sourceLinked="1"/>
         <c:tickLblPos val="nextTo"/>
-        <c:crossAx val="81065856"/>
+        <c:crossAx val="68665728"/>
         <c:crosses val="autoZero"/>
         <c:crossBetween val="between"/>
       </c:valAx>
@@ -6101,16 +6105,16 @@
                 <c:formatCode>0.0000</c:formatCode>
                 <c:ptCount val="5"/>
                 <c:pt idx="0">
-                  <c:v>1.9981622695922669E-3</c:v>
-                </c:pt>
-                <c:pt idx="1">
-                  <c:v>6.3767830530802342E-3</c:v>
-                </c:pt>
-                <c:pt idx="2">
-                  <c:v>8.2647820313771325E-2</c:v>
-                </c:pt>
-                <c:pt idx="3">
-                  <c:v>0.56063678264618</c:v>
+                  <c:v>1.9981622695922673E-3</c:v>
+                </c:pt>
+                <c:pt idx="1">
+                  <c:v>6.376783053080236E-3</c:v>
+                </c:pt>
+                <c:pt idx="2">
+                  <c:v>8.2647820313771339E-2</c:v>
+                </c:pt>
+                <c:pt idx="3">
+                  <c:v>0.56063678264618011</c:v>
                 </c:pt>
                 <c:pt idx="4">
                   <c:v>9.7511391480763674</c:v>
@@ -6163,19 +6167,19 @@
                 <c:formatCode>0.0000</c:formatCode>
                 <c:ptCount val="5"/>
                 <c:pt idx="0">
-                  <c:v>6.1292401949564661E-3</c:v>
-                </c:pt>
-                <c:pt idx="1">
-                  <c:v>2.8544862270355336E-2</c:v>
-                </c:pt>
-                <c:pt idx="2">
-                  <c:v>0.29650978326797334</c:v>
+                  <c:v>6.1292401949564678E-3</c:v>
+                </c:pt>
+                <c:pt idx="1">
+                  <c:v>2.854486227035534E-2</c:v>
+                </c:pt>
+                <c:pt idx="2">
+                  <c:v>0.29650978326797345</c:v>
                 </c:pt>
                 <c:pt idx="3">
                   <c:v>2.2830468495687</c:v>
                 </c:pt>
                 <c:pt idx="4">
-                  <c:v>44.771103556950663</c:v>
+                  <c:v>44.771103556950656</c:v>
                 </c:pt>
               </c:numCache>
             </c:numRef>
@@ -6225,13 +6229,13 @@
                 <c:formatCode>0.0000</c:formatCode>
                 <c:ptCount val="5"/>
                 <c:pt idx="0">
-                  <c:v>1.2215555111567333E-2</c:v>
-                </c:pt>
-                <c:pt idx="1">
-                  <c:v>5.6463401317596668E-2</c:v>
-                </c:pt>
-                <c:pt idx="2">
-                  <c:v>0.57053038954735003</c:v>
+                  <c:v>1.2215555111567336E-2</c:v>
+                </c:pt>
+                <c:pt idx="1">
+                  <c:v>5.6463401317596688E-2</c:v>
+                </c:pt>
+                <c:pt idx="2">
+                  <c:v>0.5705303895473498</c:v>
                 </c:pt>
                 <c:pt idx="3">
                   <c:v>4.6100266349315673</c:v>
@@ -6284,27 +6288,27 @@
                 <c:formatCode>0.0000</c:formatCode>
                 <c:ptCount val="5"/>
                 <c:pt idx="0">
-                  <c:v>1.8350254959530334E-2</c:v>
-                </c:pt>
-                <c:pt idx="1">
-                  <c:v>7.5906745327843667E-2</c:v>
-                </c:pt>
-                <c:pt idx="2">
-                  <c:v>0.79610267665651335</c:v>
-                </c:pt>
-                <c:pt idx="3">
-                  <c:v>7.0060089058346335</c:v>
+                  <c:v>1.8350254959530337E-2</c:v>
+                </c:pt>
+                <c:pt idx="1">
+                  <c:v>7.590674532784368E-2</c:v>
+                </c:pt>
+                <c:pt idx="2">
+                  <c:v>0.79610267665651346</c:v>
+                </c:pt>
+                <c:pt idx="3">
+                  <c:v>7.0060089058346353</c:v>
                 </c:pt>
               </c:numCache>
             </c:numRef>
           </c:val>
         </c:ser>
         <c:marker val="1"/>
-        <c:axId val="96413952"/>
-        <c:axId val="96600448"/>
+        <c:axId val="69121536"/>
+        <c:axId val="69123456"/>
       </c:lineChart>
       <c:catAx>
-        <c:axId val="96413952"/>
+        <c:axId val="69121536"/>
         <c:scaling>
           <c:orientation val="minMax"/>
         </c:scaling>
@@ -6328,14 +6332,14 @@
           <c:layout/>
         </c:title>
         <c:tickLblPos val="nextTo"/>
-        <c:crossAx val="96600448"/>
+        <c:crossAx val="69123456"/>
         <c:crosses val="autoZero"/>
         <c:auto val="1"/>
         <c:lblAlgn val="ctr"/>
         <c:lblOffset val="100"/>
       </c:catAx>
       <c:valAx>
-        <c:axId val="96600448"/>
+        <c:axId val="69123456"/>
         <c:scaling>
           <c:orientation val="minMax"/>
         </c:scaling>
@@ -6361,7 +6365,7 @@
         </c:title>
         <c:numFmt formatCode="0.0000" sourceLinked="1"/>
         <c:tickLblPos val="nextTo"/>
-        <c:crossAx val="96413952"/>
+        <c:crossAx val="69121536"/>
         <c:crosses val="autoZero"/>
         <c:crossBetween val="between"/>
       </c:valAx>
@@ -6446,19 +6450,19 @@
                 <c:formatCode>0.0000</c:formatCode>
                 <c:ptCount val="5"/>
                 <c:pt idx="0">
-                  <c:v>1.6945083936055667E-3</c:v>
-                </c:pt>
-                <c:pt idx="1">
-                  <c:v>5.2900950113932326E-3</c:v>
-                </c:pt>
-                <c:pt idx="2">
-                  <c:v>8.616061210632335E-2</c:v>
+                  <c:v>1.6945083936055669E-3</c:v>
+                </c:pt>
+                <c:pt idx="1">
+                  <c:v>5.2900950113932343E-3</c:v>
+                </c:pt>
+                <c:pt idx="2">
+                  <c:v>8.6160612106323364E-2</c:v>
                 </c:pt>
                 <c:pt idx="3">
                   <c:v>0.52489698330560997</c:v>
                 </c:pt>
                 <c:pt idx="4">
-                  <c:v>8.8842568238576334</c:v>
+                  <c:v>8.8842568238576352</c:v>
                 </c:pt>
               </c:numCache>
             </c:numRef>
@@ -6508,19 +6512,19 @@
                 <c:formatCode>0.0000</c:formatCode>
                 <c:ptCount val="5"/>
                 <c:pt idx="0">
-                  <c:v>1.0758678118387667E-2</c:v>
-                </c:pt>
-                <c:pt idx="1">
-                  <c:v>1.9993654886881332E-2</c:v>
-                </c:pt>
-                <c:pt idx="2">
-                  <c:v>0.10196973482768001</c:v>
+                  <c:v>1.0758678118387668E-2</c:v>
+                </c:pt>
+                <c:pt idx="1">
+                  <c:v>1.9993654886881335E-2</c:v>
+                </c:pt>
+                <c:pt idx="2">
+                  <c:v>0.10196973482768003</c:v>
                 </c:pt>
                 <c:pt idx="3">
                   <c:v>0.76761838197708332</c:v>
                 </c:pt>
                 <c:pt idx="4">
-                  <c:v>9.8376361886660657</c:v>
+                  <c:v>9.8376361886660675</c:v>
                 </c:pt>
               </c:numCache>
             </c:numRef>
@@ -6586,16 +6590,16 @@
                 <c:formatCode>0.0000</c:formatCode>
                 <c:ptCount val="5"/>
                 <c:pt idx="0">
-                  <c:v>1.9981622695922669E-3</c:v>
-                </c:pt>
-                <c:pt idx="1">
-                  <c:v>6.3767830530802342E-3</c:v>
-                </c:pt>
-                <c:pt idx="2">
-                  <c:v>8.2647820313771325E-2</c:v>
-                </c:pt>
-                <c:pt idx="3">
-                  <c:v>0.56063678264618</c:v>
+                  <c:v>1.9981622695922673E-3</c:v>
+                </c:pt>
+                <c:pt idx="1">
+                  <c:v>6.376783053080236E-3</c:v>
+                </c:pt>
+                <c:pt idx="2">
+                  <c:v>8.2647820313771339E-2</c:v>
+                </c:pt>
+                <c:pt idx="3">
+                  <c:v>0.56063678264618011</c:v>
                 </c:pt>
                 <c:pt idx="4">
                   <c:v>9.7511391480763674</c:v>
@@ -6605,11 +6609,11 @@
           </c:val>
         </c:ser>
         <c:marker val="1"/>
-        <c:axId val="66990080"/>
-        <c:axId val="74994432"/>
+        <c:axId val="70920832"/>
+        <c:axId val="70931200"/>
       </c:lineChart>
       <c:catAx>
-        <c:axId val="66990080"/>
+        <c:axId val="70920832"/>
         <c:scaling>
           <c:orientation val="minMax"/>
         </c:scaling>
@@ -6633,14 +6637,14 @@
           <c:layout/>
         </c:title>
         <c:tickLblPos val="nextTo"/>
-        <c:crossAx val="74994432"/>
+        <c:crossAx val="70931200"/>
         <c:crosses val="autoZero"/>
         <c:auto val="1"/>
         <c:lblAlgn val="ctr"/>
         <c:lblOffset val="100"/>
       </c:catAx>
       <c:valAx>
-        <c:axId val="74994432"/>
+        <c:axId val="70931200"/>
         <c:scaling>
           <c:orientation val="minMax"/>
         </c:scaling>
@@ -6666,7 +6670,7 @@
         </c:title>
         <c:numFmt formatCode="0.0000" sourceLinked="1"/>
         <c:tickLblPos val="nextTo"/>
-        <c:crossAx val="66990080"/>
+        <c:crossAx val="70920832"/>
         <c:crosses val="autoZero"/>
         <c:crossBetween val="between"/>
       </c:valAx>
@@ -6754,16 +6758,16 @@
                   <c:v>1.0186853408813501E-2</c:v>
                 </c:pt>
                 <c:pt idx="1">
-                  <c:v>2.5026895205179669E-2</c:v>
-                </c:pt>
-                <c:pt idx="2">
-                  <c:v>0.40553862333297669</c:v>
+                  <c:v>2.5026895205179672E-2</c:v>
+                </c:pt>
+                <c:pt idx="2">
+                  <c:v>0.4055386233329768</c:v>
                 </c:pt>
                 <c:pt idx="3">
                   <c:v>2.3096298885345332</c:v>
                 </c:pt>
                 <c:pt idx="4">
-                  <c:v>39.493453658421998</c:v>
+                  <c:v>39.493453658422006</c:v>
                 </c:pt>
               </c:numCache>
             </c:numRef>
@@ -6813,13 +6817,13 @@
                 <c:formatCode>0.0000</c:formatCode>
                 <c:ptCount val="5"/>
                 <c:pt idx="0">
-                  <c:v>4.7517673174540663E-2</c:v>
+                  <c:v>4.7517673174540684E-2</c:v>
                 </c:pt>
                 <c:pt idx="1">
                   <c:v>8.0892871220906992E-2</c:v>
                 </c:pt>
                 <c:pt idx="2">
-                  <c:v>0.41876263618469328</c:v>
+                  <c:v>0.41876263618469334</c:v>
                 </c:pt>
                 <c:pt idx="3">
                   <c:v>3.3636263863245994</c:v>
@@ -6855,7 +6859,7 @@
                   <c:v>6.0225582122802671E-3</c:v>
                 </c:pt>
                 <c:pt idx="1">
-                  <c:v>2.6734676361084331E-2</c:v>
+                  <c:v>2.6734676361084335E-2</c:v>
                 </c:pt>
                 <c:pt idx="2">
                   <c:v>0.26695565780003999</c:v>
@@ -6864,7 +6868,7 @@
                   <c:v>2.3193454178174333</c:v>
                 </c:pt>
                 <c:pt idx="4">
-                  <c:v>44.898988934357995</c:v>
+                  <c:v>44.898988934358009</c:v>
                 </c:pt>
               </c:numCache>
             </c:numRef>
@@ -6891,30 +6895,30 @@
                 <c:formatCode>0.0000</c:formatCode>
                 <c:ptCount val="5"/>
                 <c:pt idx="0">
-                  <c:v>6.1292401949564661E-3</c:v>
-                </c:pt>
-                <c:pt idx="1">
-                  <c:v>2.8544862270355336E-2</c:v>
-                </c:pt>
-                <c:pt idx="2">
-                  <c:v>0.29650978326797334</c:v>
+                  <c:v>6.1292401949564678E-3</c:v>
+                </c:pt>
+                <c:pt idx="1">
+                  <c:v>2.854486227035534E-2</c:v>
+                </c:pt>
+                <c:pt idx="2">
+                  <c:v>0.29650978326797345</c:v>
                 </c:pt>
                 <c:pt idx="3">
                   <c:v>2.2830468495687</c:v>
                 </c:pt>
                 <c:pt idx="4">
-                  <c:v>44.771103556950663</c:v>
+                  <c:v>44.771103556950656</c:v>
                 </c:pt>
               </c:numCache>
             </c:numRef>
           </c:val>
         </c:ser>
         <c:marker val="1"/>
-        <c:axId val="66486272"/>
-        <c:axId val="73765632"/>
+        <c:axId val="70856704"/>
+        <c:axId val="70858624"/>
       </c:lineChart>
       <c:catAx>
-        <c:axId val="66486272"/>
+        <c:axId val="70856704"/>
         <c:scaling>
           <c:orientation val="minMax"/>
         </c:scaling>
@@ -6938,14 +6942,14 @@
           <c:layout/>
         </c:title>
         <c:tickLblPos val="nextTo"/>
-        <c:crossAx val="73765632"/>
+        <c:crossAx val="70858624"/>
         <c:crosses val="autoZero"/>
         <c:auto val="1"/>
         <c:lblAlgn val="ctr"/>
         <c:lblOffset val="100"/>
       </c:catAx>
       <c:valAx>
-        <c:axId val="73765632"/>
+        <c:axId val="70858624"/>
         <c:scaling>
           <c:orientation val="minMax"/>
         </c:scaling>
@@ -6971,7 +6975,7 @@
         </c:title>
         <c:numFmt formatCode="0.0000" sourceLinked="1"/>
         <c:tickLblPos val="nextTo"/>
-        <c:crossAx val="66486272"/>
+        <c:crossAx val="70856704"/>
         <c:crosses val="autoZero"/>
         <c:crossBetween val="between"/>
       </c:valAx>
@@ -7056,13 +7060,13 @@
                 <c:formatCode>0.0000</c:formatCode>
                 <c:ptCount val="5"/>
                 <c:pt idx="0">
-                  <c:v>1.1324619849522669E-2</c:v>
-                </c:pt>
-                <c:pt idx="1">
-                  <c:v>5.0023072957992666E-2</c:v>
-                </c:pt>
-                <c:pt idx="2">
-                  <c:v>0.80456972519556669</c:v>
+                  <c:v>1.1324619849522672E-2</c:v>
+                </c:pt>
+                <c:pt idx="1">
+                  <c:v>5.0023072957992687E-2</c:v>
+                </c:pt>
+                <c:pt idx="2">
+                  <c:v>0.80456972519556658</c:v>
                 </c:pt>
                 <c:pt idx="3">
                   <c:v>4.6152388628323671</c:v>
@@ -7118,10 +7122,10 @@
                   <c:v>9.6716419458389005E-2</c:v>
                 </c:pt>
                 <c:pt idx="1">
-                  <c:v>0.14485155582427667</c:v>
-                </c:pt>
-                <c:pt idx="2">
-                  <c:v>0.74731169740358994</c:v>
+                  <c:v>0.1448515558242767</c:v>
+                </c:pt>
+                <c:pt idx="2">
+                  <c:v>0.74731169740359016</c:v>
                 </c:pt>
                 <c:pt idx="3">
                   <c:v>6.4079488476117668</c:v>
@@ -7151,16 +7155,16 @@
                 <c:formatCode>0.0000</c:formatCode>
                 <c:ptCount val="5"/>
                 <c:pt idx="0">
-                  <c:v>1.4364671309789001E-2</c:v>
-                </c:pt>
-                <c:pt idx="1">
-                  <c:v>4.8234377702077336E-2</c:v>
+                  <c:v>1.4364671309789002E-2</c:v>
+                </c:pt>
+                <c:pt idx="1">
+                  <c:v>4.8234377702077329E-2</c:v>
                 </c:pt>
                 <c:pt idx="2">
                   <c:v>0.52003844817479672</c:v>
                 </c:pt>
                 <c:pt idx="3">
-                  <c:v>4.5076862804094997</c:v>
+                  <c:v>4.5076862804094988</c:v>
                 </c:pt>
               </c:numCache>
             </c:numRef>
@@ -7187,13 +7191,13 @@
                 <c:formatCode>0.0000</c:formatCode>
                 <c:ptCount val="5"/>
                 <c:pt idx="0">
-                  <c:v>1.2215555111567333E-2</c:v>
-                </c:pt>
-                <c:pt idx="1">
-                  <c:v>5.6463401317596668E-2</c:v>
-                </c:pt>
-                <c:pt idx="2">
-                  <c:v>0.57053038954735003</c:v>
+                  <c:v>1.2215555111567336E-2</c:v>
+                </c:pt>
+                <c:pt idx="1">
+                  <c:v>5.6463401317596688E-2</c:v>
+                </c:pt>
+                <c:pt idx="2">
+                  <c:v>0.5705303895473498</c:v>
                 </c:pt>
                 <c:pt idx="3">
                   <c:v>4.6100266349315673</c:v>
@@ -7203,11 +7207,11 @@
           </c:val>
         </c:ser>
         <c:marker val="1"/>
-        <c:axId val="75426432"/>
-        <c:axId val="75952896"/>
+        <c:axId val="70902912"/>
+        <c:axId val="70904832"/>
       </c:lineChart>
       <c:catAx>
-        <c:axId val="75426432"/>
+        <c:axId val="70902912"/>
         <c:scaling>
           <c:orientation val="minMax"/>
         </c:scaling>
@@ -7231,14 +7235,14 @@
           <c:layout/>
         </c:title>
         <c:tickLblPos val="nextTo"/>
-        <c:crossAx val="75952896"/>
+        <c:crossAx val="70904832"/>
         <c:crosses val="autoZero"/>
         <c:auto val="1"/>
         <c:lblAlgn val="ctr"/>
         <c:lblOffset val="100"/>
       </c:catAx>
       <c:valAx>
-        <c:axId val="75952896"/>
+        <c:axId val="70904832"/>
         <c:scaling>
           <c:orientation val="minMax"/>
         </c:scaling>
@@ -7264,7 +7268,7 @@
         </c:title>
         <c:numFmt formatCode="0.0000" sourceLinked="1"/>
         <c:tickLblPos val="nextTo"/>
-        <c:crossAx val="75426432"/>
+        <c:crossAx val="70902912"/>
         <c:crosses val="autoZero"/>
         <c:crossBetween val="between"/>
       </c:valAx>
@@ -7349,10 +7353,10 @@
                 <c:formatCode>0.0000</c:formatCode>
                 <c:ptCount val="5"/>
                 <c:pt idx="0">
-                  <c:v>1.7366109689076668E-2</c:v>
-                </c:pt>
-                <c:pt idx="1">
-                  <c:v>7.7328193717532676E-2</c:v>
+                  <c:v>1.7366109689076672E-2</c:v>
+                </c:pt>
+                <c:pt idx="1">
+                  <c:v>7.7328193717532689E-2</c:v>
                 </c:pt>
                 <c:pt idx="2">
                   <c:v>1.1825959576500999</c:v>
@@ -7408,10 +7412,10 @@
                 <c:formatCode>0.0000</c:formatCode>
                 <c:ptCount val="5"/>
                 <c:pt idx="0">
-                  <c:v>0.14001714150110667</c:v>
-                </c:pt>
-                <c:pt idx="1">
-                  <c:v>0.21019121276007668</c:v>
+                  <c:v>0.14001714150110675</c:v>
+                </c:pt>
+                <c:pt idx="1">
+                  <c:v>0.21019121276007671</c:v>
                 </c:pt>
                 <c:pt idx="2">
                   <c:v>1.3110732327567001</c:v>
@@ -7444,16 +7448,16 @@
                 <c:formatCode>0.0000</c:formatCode>
                 <c:ptCount val="5"/>
                 <c:pt idx="0">
-                  <c:v>1.9718332820468334E-2</c:v>
-                </c:pt>
-                <c:pt idx="1">
-                  <c:v>7.7481534481048664E-2</c:v>
-                </c:pt>
-                <c:pt idx="2">
-                  <c:v>0.79726580328411334</c:v>
-                </c:pt>
-                <c:pt idx="3">
-                  <c:v>6.8460096499654997</c:v>
+                  <c:v>1.9718332820468337E-2</c:v>
+                </c:pt>
+                <c:pt idx="1">
+                  <c:v>7.7481534481048678E-2</c:v>
+                </c:pt>
+                <c:pt idx="2">
+                  <c:v>0.79726580328411345</c:v>
+                </c:pt>
+                <c:pt idx="3">
+                  <c:v>6.8460096499654988</c:v>
                 </c:pt>
               </c:numCache>
             </c:numRef>
@@ -7480,27 +7484,27 @@
                 <c:formatCode>0.0000</c:formatCode>
                 <c:ptCount val="5"/>
                 <c:pt idx="0">
-                  <c:v>1.8350254959530334E-2</c:v>
-                </c:pt>
-                <c:pt idx="1">
-                  <c:v>7.5906745327843667E-2</c:v>
-                </c:pt>
-                <c:pt idx="2">
-                  <c:v>0.79610267665651335</c:v>
-                </c:pt>
-                <c:pt idx="3">
-                  <c:v>7.0060089058346335</c:v>
+                  <c:v>1.8350254959530337E-2</c:v>
+                </c:pt>
+                <c:pt idx="1">
+                  <c:v>7.590674532784368E-2</c:v>
+                </c:pt>
+                <c:pt idx="2">
+                  <c:v>0.79610267665651346</c:v>
+                </c:pt>
+                <c:pt idx="3">
+                  <c:v>7.0060089058346353</c:v>
                 </c:pt>
               </c:numCache>
             </c:numRef>
           </c:val>
         </c:ser>
         <c:marker val="1"/>
-        <c:axId val="76232576"/>
-        <c:axId val="76240384"/>
+        <c:axId val="71284992"/>
+        <c:axId val="71299456"/>
       </c:lineChart>
       <c:catAx>
-        <c:axId val="76232576"/>
+        <c:axId val="71284992"/>
         <c:scaling>
           <c:orientation val="minMax"/>
         </c:scaling>
@@ -7524,14 +7528,14 @@
           <c:layout/>
         </c:title>
         <c:tickLblPos val="nextTo"/>
-        <c:crossAx val="76240384"/>
+        <c:crossAx val="71299456"/>
         <c:crosses val="autoZero"/>
         <c:auto val="1"/>
         <c:lblAlgn val="ctr"/>
         <c:lblOffset val="100"/>
       </c:catAx>
       <c:valAx>
-        <c:axId val="76240384"/>
+        <c:axId val="71299456"/>
         <c:scaling>
           <c:orientation val="minMax"/>
         </c:scaling>
@@ -7557,7 +7561,7 @@
         </c:title>
         <c:numFmt formatCode="0.0000" sourceLinked="1"/>
         <c:tickLblPos val="nextTo"/>
-        <c:crossAx val="76232576"/>
+        <c:crossAx val="71284992"/>
         <c:crosses val="autoZero"/>
         <c:crossBetween val="between"/>
       </c:valAx>
@@ -7643,19 +7647,19 @@
                 <c:formatCode>0.0000</c:formatCode>
                 <c:ptCount val="5"/>
                 <c:pt idx="0">
-                  <c:v>8.8080565134684655E-3</c:v>
-                </c:pt>
-                <c:pt idx="1">
-                  <c:v>2.3829301198323664E-2</c:v>
-                </c:pt>
-                <c:pt idx="2">
-                  <c:v>0.41197864214579</c:v>
+                  <c:v>8.808056513468469E-3</c:v>
+                </c:pt>
+                <c:pt idx="1">
+                  <c:v>2.3829301198323671E-2</c:v>
+                </c:pt>
+                <c:pt idx="2">
+                  <c:v>0.41197864214579005</c:v>
                 </c:pt>
                 <c:pt idx="3">
                   <c:v>2.5611866315206</c:v>
                 </c:pt>
                 <c:pt idx="4">
-                  <c:v>36.06085324287433</c:v>
+                  <c:v>36.060853242874337</c:v>
                 </c:pt>
               </c:numCache>
             </c:numRef>
@@ -7705,10 +7709,10 @@
                 <c:formatCode>0.0000</c:formatCode>
                 <c:ptCount val="5"/>
                 <c:pt idx="0">
-                  <c:v>0.115225156148275</c:v>
-                </c:pt>
-                <c:pt idx="1">
-                  <c:v>0.11600995063781666</c:v>
+                  <c:v>0.11522515614827503</c:v>
+                </c:pt>
+                <c:pt idx="1">
+                  <c:v>0.11600995063781665</c:v>
                 </c:pt>
                 <c:pt idx="2">
                   <c:v>1.7640364964803332</c:v>
@@ -7717,7 +7721,7 @@
                   <c:v>10.2913300991056</c:v>
                 </c:pt>
                 <c:pt idx="4">
-                  <c:v>162.72489585876667</c:v>
+                  <c:v>162.72489585876664</c:v>
                 </c:pt>
               </c:numCache>
             </c:numRef>
@@ -7776,7 +7780,7 @@
                   <c:v>3.5624407370885329</c:v>
                 </c:pt>
                 <c:pt idx="3">
-                  <c:v>20.826281388600666</c:v>
+                  <c:v>20.82628138860067</c:v>
                 </c:pt>
               </c:numCache>
             </c:numRef>
@@ -7826,27 +7830,27 @@
                 <c:formatCode>0.0000</c:formatCode>
                 <c:ptCount val="5"/>
                 <c:pt idx="0">
-                  <c:v>0.11224088668823334</c:v>
-                </c:pt>
-                <c:pt idx="1">
-                  <c:v>0.38475763003031332</c:v>
-                </c:pt>
-                <c:pt idx="2">
-                  <c:v>4.9616109583112999</c:v>
-                </c:pt>
-                <c:pt idx="3">
-                  <c:v>33.610920672946328</c:v>
+                  <c:v>0.11224088668823336</c:v>
+                </c:pt>
+                <c:pt idx="1">
+                  <c:v>0.38475763003031327</c:v>
+                </c:pt>
+                <c:pt idx="2">
+                  <c:v>4.9616109583112991</c:v>
+                </c:pt>
+                <c:pt idx="3">
+                  <c:v>33.610920672946321</c:v>
                 </c:pt>
               </c:numCache>
             </c:numRef>
           </c:val>
         </c:ser>
         <c:marker val="1"/>
-        <c:axId val="76645504"/>
-        <c:axId val="79091968"/>
+        <c:axId val="71327104"/>
+        <c:axId val="71345664"/>
       </c:lineChart>
       <c:catAx>
-        <c:axId val="76645504"/>
+        <c:axId val="71327104"/>
         <c:scaling>
           <c:orientation val="minMax"/>
         </c:scaling>
@@ -7870,14 +7874,14 @@
           <c:layout/>
         </c:title>
         <c:tickLblPos val="nextTo"/>
-        <c:crossAx val="79091968"/>
+        <c:crossAx val="71345664"/>
         <c:crosses val="autoZero"/>
         <c:auto val="1"/>
         <c:lblAlgn val="ctr"/>
         <c:lblOffset val="100"/>
       </c:catAx>
       <c:valAx>
-        <c:axId val="79091968"/>
+        <c:axId val="71345664"/>
         <c:scaling>
           <c:orientation val="minMax"/>
         </c:scaling>
@@ -7903,7 +7907,7 @@
         </c:title>
         <c:numFmt formatCode="0.0000" sourceLinked="1"/>
         <c:tickLblPos val="nextTo"/>
-        <c:crossAx val="76645504"/>
+        <c:crossAx val="71327104"/>
         <c:crosses val="autoZero"/>
         <c:crossBetween val="between"/>
       </c:valAx>
@@ -7916,6 +7920,166 @@
   </c:chart>
   <c:externalData r:id="rId1"/>
 </c:chartSpace>
+</file>
+
+<file path=ppt/handoutMasters/handoutMaster1.xml><?xml version="1.0" encoding="utf-8"?>
+<p:handoutMaster xmlns:a="http://schemas.openxmlformats.org/drawingml/2006/main" xmlns:r="http://schemas.openxmlformats.org/officeDocument/2006/relationships" xmlns:p="http://schemas.openxmlformats.org/presentationml/2006/main">
+  <p:cSld>
+    <p:bg>
+      <p:bgRef idx="1001">
+        <a:schemeClr val="bg1"/>
+      </p:bgRef>
+    </p:bg>
+    <p:spTree>
+      <p:nvGrpSpPr>
+        <p:cNvPr id="1" name=""/>
+        <p:cNvGrpSpPr/>
+        <p:nvPr/>
+      </p:nvGrpSpPr>
+      <p:grpSpPr>
+        <a:xfrm>
+          <a:off x="0" y="0"/>
+          <a:ext cx="0" cy="0"/>
+          <a:chOff x="0" y="0"/>
+          <a:chExt cx="0" cy="0"/>
+        </a:xfrm>
+      </p:grpSpPr>
+      <p:sp>
+        <p:nvSpPr>
+          <p:cNvPr id="2" name="Espaço Reservado para Cabeçalho 1"/>
+          <p:cNvSpPr>
+            <a:spLocks noGrp="1"/>
+          </p:cNvSpPr>
+          <p:nvPr>
+            <p:ph type="hdr" sz="quarter"/>
+          </p:nvPr>
+        </p:nvSpPr>
+        <p:spPr>
+          <a:xfrm>
+            <a:off x="0" y="0"/>
+            <a:ext cx="2971800" cy="457200"/>
+          </a:xfrm>
+          <a:prstGeom prst="rect">
+            <a:avLst/>
+          </a:prstGeom>
+        </p:spPr>
+        <p:txBody>
+          <a:bodyPr vert="horz" lIns="91440" tIns="45720" rIns="91440" bIns="45720" rtlCol="0"/>
+          <a:lstStyle>
+            <a:lvl1pPr algn="l">
+              <a:defRPr sz="1200"/>
+            </a:lvl1pPr>
+          </a:lstStyle>
+          <a:p>
+            <a:endParaRPr lang="pt-BR"/>
+          </a:p>
+        </p:txBody>
+      </p:sp>
+      <p:sp>
+        <p:nvSpPr>
+          <p:cNvPr id="3" name="Espaço Reservado para Data 2"/>
+          <p:cNvSpPr>
+            <a:spLocks noGrp="1"/>
+          </p:cNvSpPr>
+          <p:nvPr>
+            <p:ph type="dt" sz="quarter" idx="1"/>
+          </p:nvPr>
+        </p:nvSpPr>
+        <p:spPr>
+          <a:xfrm>
+            <a:off x="3884613" y="0"/>
+            <a:ext cx="2971800" cy="457200"/>
+          </a:xfrm>
+          <a:prstGeom prst="rect">
+            <a:avLst/>
+          </a:prstGeom>
+        </p:spPr>
+        <p:txBody>
+          <a:bodyPr vert="horz" lIns="91440" tIns="45720" rIns="91440" bIns="45720" rtlCol="0"/>
+          <a:lstStyle>
+            <a:lvl1pPr algn="r">
+              <a:defRPr sz="1200"/>
+            </a:lvl1pPr>
+          </a:lstStyle>
+          <a:p>
+            <a:fld id="{F0D1FD64-7DF7-4684-BD83-7F6983408F02}" type="datetimeFigureOut">
+              <a:rPr lang="pt-BR" smtClean="0"/>
+              <a:t>08/04/2010</a:t>
+            </a:fld>
+            <a:endParaRPr lang="pt-BR"/>
+          </a:p>
+        </p:txBody>
+      </p:sp>
+      <p:sp>
+        <p:nvSpPr>
+          <p:cNvPr id="4" name="Espaço Reservado para Rodapé 3"/>
+          <p:cNvSpPr>
+            <a:spLocks noGrp="1"/>
+          </p:cNvSpPr>
+          <p:nvPr>
+            <p:ph type="ftr" sz="quarter" idx="2"/>
+          </p:nvPr>
+        </p:nvSpPr>
+        <p:spPr>
+          <a:xfrm>
+            <a:off x="0" y="8685213"/>
+            <a:ext cx="2971800" cy="457200"/>
+          </a:xfrm>
+          <a:prstGeom prst="rect">
+            <a:avLst/>
+          </a:prstGeom>
+        </p:spPr>
+        <p:txBody>
+          <a:bodyPr vert="horz" lIns="91440" tIns="45720" rIns="91440" bIns="45720" rtlCol="0" anchor="b"/>
+          <a:lstStyle>
+            <a:lvl1pPr algn="l">
+              <a:defRPr sz="1200"/>
+            </a:lvl1pPr>
+          </a:lstStyle>
+          <a:p>
+            <a:endParaRPr lang="pt-BR"/>
+          </a:p>
+        </p:txBody>
+      </p:sp>
+      <p:sp>
+        <p:nvSpPr>
+          <p:cNvPr id="5" name="Espaço Reservado para Número de Slide 4"/>
+          <p:cNvSpPr>
+            <a:spLocks noGrp="1"/>
+          </p:cNvSpPr>
+          <p:nvPr>
+            <p:ph type="sldNum" sz="quarter" idx="3"/>
+          </p:nvPr>
+        </p:nvSpPr>
+        <p:spPr>
+          <a:xfrm>
+            <a:off x="3884613" y="8685213"/>
+            <a:ext cx="2971800" cy="457200"/>
+          </a:xfrm>
+          <a:prstGeom prst="rect">
+            <a:avLst/>
+          </a:prstGeom>
+        </p:spPr>
+        <p:txBody>
+          <a:bodyPr vert="horz" lIns="91440" tIns="45720" rIns="91440" bIns="45720" rtlCol="0" anchor="b"/>
+          <a:lstStyle>
+            <a:lvl1pPr algn="r">
+              <a:defRPr sz="1200"/>
+            </a:lvl1pPr>
+          </a:lstStyle>
+          <a:p>
+            <a:fld id="{4264D2C6-5C6C-4220-9542-1849D58425D7}" type="slidenum">
+              <a:rPr lang="pt-BR" smtClean="0"/>
+              <a:t>‹nº›</a:t>
+            </a:fld>
+            <a:endParaRPr lang="pt-BR"/>
+          </a:p>
+        </p:txBody>
+      </p:sp>
+    </p:spTree>
+  </p:cSld>
+  <p:clrMap bg1="lt1" tx1="dk1" bg2="lt2" tx2="dk2" accent1="accent1" accent2="accent2" accent3="accent3" accent4="accent4" accent5="accent5" accent6="accent6" hlink="hlink" folHlink="folHlink"/>
+</p:handoutMaster>
 </file>
 
 <file path=ppt/slideLayouts/slideLayout1.xml><?xml version="1.0" encoding="utf-8"?>
@@ -8099,6 +8263,7 @@
           <a:p>
             <a:fld id="{856FDB92-F19B-4A5C-ADFB-2A835DB85360}" type="datetimeFigureOut">
               <a:rPr lang="pt-BR" smtClean="0"/>
+              <a:pPr/>
               <a:t>08/04/2010</a:t>
             </a:fld>
             <a:endParaRPr lang="pt-BR"/>
@@ -8141,6 +8306,7 @@
           <a:p>
             <a:fld id="{17C1B71C-CC2F-46B3-A835-D78F78AE3225}" type="slidenum">
               <a:rPr lang="pt-BR" smtClean="0"/>
+              <a:pPr/>
               <a:t>‹nº›</a:t>
             </a:fld>
             <a:endParaRPr lang="pt-BR"/>
@@ -8264,6 +8430,7 @@
           <a:p>
             <a:fld id="{856FDB92-F19B-4A5C-ADFB-2A835DB85360}" type="datetimeFigureOut">
               <a:rPr lang="pt-BR" smtClean="0"/>
+              <a:pPr/>
               <a:t>08/04/2010</a:t>
             </a:fld>
             <a:endParaRPr lang="pt-BR"/>
@@ -8306,6 +8473,7 @@
           <a:p>
             <a:fld id="{17C1B71C-CC2F-46B3-A835-D78F78AE3225}" type="slidenum">
               <a:rPr lang="pt-BR" smtClean="0"/>
+              <a:pPr/>
               <a:t>‹nº›</a:t>
             </a:fld>
             <a:endParaRPr lang="pt-BR"/>
@@ -8439,6 +8607,7 @@
           <a:p>
             <a:fld id="{856FDB92-F19B-4A5C-ADFB-2A835DB85360}" type="datetimeFigureOut">
               <a:rPr lang="pt-BR" smtClean="0"/>
+              <a:pPr/>
               <a:t>08/04/2010</a:t>
             </a:fld>
             <a:endParaRPr lang="pt-BR"/>
@@ -8481,6 +8650,7 @@
           <a:p>
             <a:fld id="{17C1B71C-CC2F-46B3-A835-D78F78AE3225}" type="slidenum">
               <a:rPr lang="pt-BR" smtClean="0"/>
+              <a:pPr/>
               <a:t>‹nº›</a:t>
             </a:fld>
             <a:endParaRPr lang="pt-BR"/>
@@ -8604,6 +8774,7 @@
           <a:p>
             <a:fld id="{856FDB92-F19B-4A5C-ADFB-2A835DB85360}" type="datetimeFigureOut">
               <a:rPr lang="pt-BR" smtClean="0"/>
+              <a:pPr/>
               <a:t>08/04/2010</a:t>
             </a:fld>
             <a:endParaRPr lang="pt-BR"/>
@@ -8646,6 +8817,7 @@
           <a:p>
             <a:fld id="{17C1B71C-CC2F-46B3-A835-D78F78AE3225}" type="slidenum">
               <a:rPr lang="pt-BR" smtClean="0"/>
+              <a:pPr/>
               <a:t>‹nº›</a:t>
             </a:fld>
             <a:endParaRPr lang="pt-BR"/>
@@ -8657,6 +8829,13 @@
   <p:clrMapOvr>
     <a:masterClrMapping/>
   </p:clrMapOvr>
+  <p:timing>
+    <p:tnLst>
+      <p:par>
+        <p:cTn id="1" dur="indefinite" restart="never" nodeType="tmRoot"/>
+      </p:par>
+    </p:tnLst>
+  </p:timing>
 </p:sldLayout>
 </file>
 
@@ -8845,6 +9024,7 @@
           <a:p>
             <a:fld id="{856FDB92-F19B-4A5C-ADFB-2A835DB85360}" type="datetimeFigureOut">
               <a:rPr lang="pt-BR" smtClean="0"/>
+              <a:pPr/>
               <a:t>08/04/2010</a:t>
             </a:fld>
             <a:endParaRPr lang="pt-BR"/>
@@ -8887,6 +9067,7 @@
           <a:p>
             <a:fld id="{17C1B71C-CC2F-46B3-A835-D78F78AE3225}" type="slidenum">
               <a:rPr lang="pt-BR" smtClean="0"/>
+              <a:pPr/>
               <a:t>‹nº›</a:t>
             </a:fld>
             <a:endParaRPr lang="pt-BR"/>
@@ -9128,6 +9309,7 @@
           <a:p>
             <a:fld id="{856FDB92-F19B-4A5C-ADFB-2A835DB85360}" type="datetimeFigureOut">
               <a:rPr lang="pt-BR" smtClean="0"/>
+              <a:pPr/>
               <a:t>08/04/2010</a:t>
             </a:fld>
             <a:endParaRPr lang="pt-BR"/>
@@ -9170,6 +9352,7 @@
           <a:p>
             <a:fld id="{17C1B71C-CC2F-46B3-A835-D78F78AE3225}" type="slidenum">
               <a:rPr lang="pt-BR" smtClean="0"/>
+              <a:pPr/>
               <a:t>‹nº›</a:t>
             </a:fld>
             <a:endParaRPr lang="pt-BR"/>
@@ -9545,6 +9728,7 @@
           <a:p>
             <a:fld id="{856FDB92-F19B-4A5C-ADFB-2A835DB85360}" type="datetimeFigureOut">
               <a:rPr lang="pt-BR" smtClean="0"/>
+              <a:pPr/>
               <a:t>08/04/2010</a:t>
             </a:fld>
             <a:endParaRPr lang="pt-BR"/>
@@ -9587,6 +9771,7 @@
           <a:p>
             <a:fld id="{17C1B71C-CC2F-46B3-A835-D78F78AE3225}" type="slidenum">
               <a:rPr lang="pt-BR" smtClean="0"/>
+              <a:pPr/>
               <a:t>‹nº›</a:t>
             </a:fld>
             <a:endParaRPr lang="pt-BR"/>
@@ -9658,6 +9843,7 @@
           <a:p>
             <a:fld id="{856FDB92-F19B-4A5C-ADFB-2A835DB85360}" type="datetimeFigureOut">
               <a:rPr lang="pt-BR" smtClean="0"/>
+              <a:pPr/>
               <a:t>08/04/2010</a:t>
             </a:fld>
             <a:endParaRPr lang="pt-BR"/>
@@ -9700,6 +9886,7 @@
           <a:p>
             <a:fld id="{17C1B71C-CC2F-46B3-A835-D78F78AE3225}" type="slidenum">
               <a:rPr lang="pt-BR" smtClean="0"/>
+              <a:pPr/>
               <a:t>‹nº›</a:t>
             </a:fld>
             <a:endParaRPr lang="pt-BR"/>
@@ -9748,6 +9935,7 @@
           <a:p>
             <a:fld id="{856FDB92-F19B-4A5C-ADFB-2A835DB85360}" type="datetimeFigureOut">
               <a:rPr lang="pt-BR" smtClean="0"/>
+              <a:pPr/>
               <a:t>08/04/2010</a:t>
             </a:fld>
             <a:endParaRPr lang="pt-BR"/>
@@ -9790,6 +9978,7 @@
           <a:p>
             <a:fld id="{17C1B71C-CC2F-46B3-A835-D78F78AE3225}" type="slidenum">
               <a:rPr lang="pt-BR" smtClean="0"/>
+              <a:pPr/>
               <a:t>‹nº›</a:t>
             </a:fld>
             <a:endParaRPr lang="pt-BR"/>
@@ -10020,6 +10209,7 @@
           <a:p>
             <a:fld id="{856FDB92-F19B-4A5C-ADFB-2A835DB85360}" type="datetimeFigureOut">
               <a:rPr lang="pt-BR" smtClean="0"/>
+              <a:pPr/>
               <a:t>08/04/2010</a:t>
             </a:fld>
             <a:endParaRPr lang="pt-BR"/>
@@ -10062,6 +10252,7 @@
           <a:p>
             <a:fld id="{17C1B71C-CC2F-46B3-A835-D78F78AE3225}" type="slidenum">
               <a:rPr lang="pt-BR" smtClean="0"/>
+              <a:pPr/>
               <a:t>‹nº›</a:t>
             </a:fld>
             <a:endParaRPr lang="pt-BR"/>
@@ -10268,6 +10459,7 @@
           <a:p>
             <a:fld id="{856FDB92-F19B-4A5C-ADFB-2A835DB85360}" type="datetimeFigureOut">
               <a:rPr lang="pt-BR" smtClean="0"/>
+              <a:pPr/>
               <a:t>08/04/2010</a:t>
             </a:fld>
             <a:endParaRPr lang="pt-BR"/>
@@ -10310,6 +10502,7 @@
           <a:p>
             <a:fld id="{17C1B71C-CC2F-46B3-A835-D78F78AE3225}" type="slidenum">
               <a:rPr lang="pt-BR" smtClean="0"/>
+              <a:pPr/>
               <a:t>‹nº›</a:t>
             </a:fld>
             <a:endParaRPr lang="pt-BR"/>
@@ -10476,6 +10669,7 @@
           <a:p>
             <a:fld id="{856FDB92-F19B-4A5C-ADFB-2A835DB85360}" type="datetimeFigureOut">
               <a:rPr lang="pt-BR" smtClean="0"/>
+              <a:pPr/>
               <a:t>08/04/2010</a:t>
             </a:fld>
             <a:endParaRPr lang="pt-BR"/>
@@ -10554,6 +10748,7 @@
           <a:p>
             <a:fld id="{17C1B71C-CC2F-46B3-A835-D78F78AE3225}" type="slidenum">
               <a:rPr lang="pt-BR" smtClean="0"/>
+              <a:pPr/>
               <a:t>‹nº›</a:t>
             </a:fld>
             <a:endParaRPr lang="pt-BR"/>
@@ -10941,6 +11136,13 @@
   <p:clrMapOvr>
     <a:masterClrMapping/>
   </p:clrMapOvr>
+  <p:timing>
+    <p:tnLst>
+      <p:par>
+        <p:cTn id="1" dur="indefinite" restart="never" nodeType="tmRoot"/>
+      </p:par>
+    </p:tnLst>
+  </p:timing>
 </p:sld>
 </file>
 
@@ -11056,6 +11258,13 @@
   <p:clrMapOvr>
     <a:masterClrMapping/>
   </p:clrMapOvr>
+  <p:timing>
+    <p:tnLst>
+      <p:par>
+        <p:cTn id="1" dur="indefinite" restart="never" nodeType="tmRoot"/>
+      </p:par>
+    </p:tnLst>
+  </p:timing>
 </p:sld>
 </file>
 
@@ -11171,6 +11380,13 @@
   <p:clrMapOvr>
     <a:masterClrMapping/>
   </p:clrMapOvr>
+  <p:timing>
+    <p:tnLst>
+      <p:par>
+        <p:cTn id="1" dur="indefinite" restart="never" nodeType="tmRoot"/>
+      </p:par>
+    </p:tnLst>
+  </p:timing>
 </p:sld>
 </file>
 
@@ -11286,6 +11502,13 @@
   <p:clrMapOvr>
     <a:masterClrMapping/>
   </p:clrMapOvr>
+  <p:timing>
+    <p:tnLst>
+      <p:par>
+        <p:cTn id="1" dur="indefinite" restart="never" nodeType="tmRoot"/>
+      </p:par>
+    </p:tnLst>
+  </p:timing>
 </p:sld>
 </file>
 
@@ -11401,6 +11624,13 @@
   <p:clrMapOvr>
     <a:masterClrMapping/>
   </p:clrMapOvr>
+  <p:timing>
+    <p:tnLst>
+      <p:par>
+        <p:cTn id="1" dur="indefinite" restart="never" nodeType="tmRoot"/>
+      </p:par>
+    </p:tnLst>
+  </p:timing>
 </p:sld>
 </file>
 
@@ -11516,6 +11746,13 @@
   <p:clrMapOvr>
     <a:masterClrMapping/>
   </p:clrMapOvr>
+  <p:timing>
+    <p:tnLst>
+      <p:par>
+        <p:cTn id="1" dur="indefinite" restart="never" nodeType="tmRoot"/>
+      </p:par>
+    </p:tnLst>
+  </p:timing>
 </p:sld>
 </file>
 
@@ -11631,6 +11868,13 @@
   <p:clrMapOvr>
     <a:masterClrMapping/>
   </p:clrMapOvr>
+  <p:timing>
+    <p:tnLst>
+      <p:par>
+        <p:cTn id="1" dur="indefinite" restart="never" nodeType="tmRoot"/>
+      </p:par>
+    </p:tnLst>
+  </p:timing>
 </p:sld>
 </file>
 
@@ -12206,6 +12450,13 @@
   <p:clrMapOvr>
     <a:masterClrMapping/>
   </p:clrMapOvr>
+  <p:timing>
+    <p:tnLst>
+      <p:par>
+        <p:cTn id="1" dur="indefinite" restart="never" nodeType="tmRoot"/>
+      </p:par>
+    </p:tnLst>
+  </p:timing>
 </p:sld>
 </file>
 
@@ -12528,7 +12779,7 @@
       </p:sp>
       <p:graphicFrame>
         <p:nvGraphicFramePr>
-          <p:cNvPr id="6" name="Espaço Reservado para Conteúdo 5"/>
+          <p:cNvPr id="8" name="Espaço Reservado para Conteúdo 7"/>
           <p:cNvGraphicFramePr>
             <a:graphicFrameLocks noGrp="1"/>
           </p:cNvGraphicFramePr>
@@ -12896,6 +13147,13 @@
   <p:clrMapOvr>
     <a:masterClrMapping/>
   </p:clrMapOvr>
+  <p:timing>
+    <p:tnLst>
+      <p:par>
+        <p:cTn id="1" dur="indefinite" restart="never" nodeType="tmRoot"/>
+      </p:par>
+    </p:tnLst>
+  </p:timing>
 </p:sld>
 </file>
 
@@ -13011,6 +13269,13 @@
   <p:clrMapOvr>
     <a:masterClrMapping/>
   </p:clrMapOvr>
+  <p:timing>
+    <p:tnLst>
+      <p:par>
+        <p:cTn id="1" dur="indefinite" restart="never" nodeType="tmRoot"/>
+      </p:par>
+    </p:tnLst>
+  </p:timing>
 </p:sld>
 </file>
 
@@ -13126,6 +13391,13 @@
   <p:clrMapOvr>
     <a:masterClrMapping/>
   </p:clrMapOvr>
+  <p:timing>
+    <p:tnLst>
+      <p:par>
+        <p:cTn id="1" dur="indefinite" restart="never" nodeType="tmRoot"/>
+      </p:par>
+    </p:tnLst>
+  </p:timing>
 </p:sld>
 </file>
 
@@ -13241,6 +13513,13 @@
   <p:clrMapOvr>
     <a:masterClrMapping/>
   </p:clrMapOvr>
+  <p:timing>
+    <p:tnLst>
+      <p:par>
+        <p:cTn id="1" dur="indefinite" restart="never" nodeType="tmRoot"/>
+      </p:par>
+    </p:tnLst>
+  </p:timing>
 </p:sld>
 </file>
 
@@ -13356,6 +13635,13 @@
   <p:clrMapOvr>
     <a:masterClrMapping/>
   </p:clrMapOvr>
+  <p:timing>
+    <p:tnLst>
+      <p:par>
+        <p:cTn id="1" dur="indefinite" restart="never" nodeType="tmRoot"/>
+      </p:par>
+    </p:tnLst>
+  </p:timing>
 </p:sld>
 </file>
 
@@ -13471,6 +13757,13 @@
   <p:clrMapOvr>
     <a:masterClrMapping/>
   </p:clrMapOvr>
+  <p:timing>
+    <p:tnLst>
+      <p:par>
+        <p:cTn id="1" dur="indefinite" restart="never" nodeType="tmRoot"/>
+      </p:par>
+    </p:tnLst>
+  </p:timing>
 </p:sld>
 </file>
 
@@ -13586,6 +13879,13 @@
   <p:clrMapOvr>
     <a:masterClrMapping/>
   </p:clrMapOvr>
+  <p:timing>
+    <p:tnLst>
+      <p:par>
+        <p:cTn id="1" dur="indefinite" restart="never" nodeType="tmRoot"/>
+      </p:par>
+    </p:tnLst>
+  </p:timing>
 </p:sld>
 </file>
 
@@ -13870,4 +14170,287 @@
   <a:objectDefaults/>
   <a:extraClrSchemeLst/>
 </a:theme>
+</file>
+
+<file path=ppt/theme/theme2.xml><?xml version="1.0" encoding="utf-8"?>
+<a:theme xmlns:a="http://schemas.openxmlformats.org/drawingml/2006/main" name="Tema do Office">
+  <a:themeElements>
+    <a:clrScheme name="Escritório">
+      <a:dk1>
+        <a:sysClr val="windowText" lastClr="000000"/>
+      </a:dk1>
+      <a:lt1>
+        <a:sysClr val="window" lastClr="FFFFFF"/>
+      </a:lt1>
+      <a:dk2>
+        <a:srgbClr val="1F497D"/>
+      </a:dk2>
+      <a:lt2>
+        <a:srgbClr val="EEECE1"/>
+      </a:lt2>
+      <a:accent1>
+        <a:srgbClr val="4F81BD"/>
+      </a:accent1>
+      <a:accent2>
+        <a:srgbClr val="C0504D"/>
+      </a:accent2>
+      <a:accent3>
+        <a:srgbClr val="9BBB59"/>
+      </a:accent3>
+      <a:accent4>
+        <a:srgbClr val="8064A2"/>
+      </a:accent4>
+      <a:accent5>
+        <a:srgbClr val="4BACC6"/>
+      </a:accent5>
+      <a:accent6>
+        <a:srgbClr val="F79646"/>
+      </a:accent6>
+      <a:hlink>
+        <a:srgbClr val="0000FF"/>
+      </a:hlink>
+      <a:folHlink>
+        <a:srgbClr val="800080"/>
+      </a:folHlink>
+    </a:clrScheme>
+    <a:fontScheme name="Escritório">
+      <a:majorFont>
+        <a:latin typeface="Calibri"/>
+        <a:ea typeface=""/>
+        <a:cs typeface=""/>
+        <a:font script="Jpan" typeface="ＭＳ Ｐゴシック"/>
+        <a:font script="Hang" typeface="맑은 고딕"/>
+        <a:font script="Hans" typeface="宋体"/>
+        <a:font script="Hant" typeface="新細明體"/>
+        <a:font script="Arab" typeface="Times New Roman"/>
+        <a:font script="Hebr" typeface="Times New Roman"/>
+        <a:font script="Thai" typeface="Angsana New"/>
+        <a:font script="Ethi" typeface="Nyala"/>
+        <a:font script="Beng" typeface="Vrinda"/>
+        <a:font script="Gujr" typeface="Shruti"/>
+        <a:font script="Khmr" typeface="MoolBoran"/>
+        <a:font script="Knda" typeface="Tunga"/>
+        <a:font script="Guru" typeface="Raavi"/>
+        <a:font script="Cans" typeface="Euphemia"/>
+        <a:font script="Cher" typeface="Plantagenet Cherokee"/>
+        <a:font script="Yiii" typeface="Microsoft Yi Baiti"/>
+        <a:font script="Tibt" typeface="Microsoft Himalaya"/>
+        <a:font script="Thaa" typeface="MV Boli"/>
+        <a:font script="Deva" typeface="Mangal"/>
+        <a:font script="Telu" typeface="Gautami"/>
+        <a:font script="Taml" typeface="Latha"/>
+        <a:font script="Syrc" typeface="Estrangelo Edessa"/>
+        <a:font script="Orya" typeface="Kalinga"/>
+        <a:font script="Mlym" typeface="Kartika"/>
+        <a:font script="Laoo" typeface="DokChampa"/>
+        <a:font script="Sinh" typeface="Iskoola Pota"/>
+        <a:font script="Mong" typeface="Mongolian Baiti"/>
+        <a:font script="Viet" typeface="Times New Roman"/>
+        <a:font script="Uigh" typeface="Microsoft Uighur"/>
+      </a:majorFont>
+      <a:minorFont>
+        <a:latin typeface="Calibri"/>
+        <a:ea typeface=""/>
+        <a:cs typeface=""/>
+        <a:font script="Jpan" typeface="ＭＳ Ｐゴシック"/>
+        <a:font script="Hang" typeface="맑은 고딕"/>
+        <a:font script="Hans" typeface="宋体"/>
+        <a:font script="Hant" typeface="新細明體"/>
+        <a:font script="Arab" typeface="Arial"/>
+        <a:font script="Hebr" typeface="Arial"/>
+        <a:font script="Thai" typeface="Cordia New"/>
+        <a:font script="Ethi" typeface="Nyala"/>
+        <a:font script="Beng" typeface="Vrinda"/>
+        <a:font script="Gujr" typeface="Shruti"/>
+        <a:font script="Khmr" typeface="DaunPenh"/>
+        <a:font script="Knda" typeface="Tunga"/>
+        <a:font script="Guru" typeface="Raavi"/>
+        <a:font script="Cans" typeface="Euphemia"/>
+        <a:font script="Cher" typeface="Plantagenet Cherokee"/>
+        <a:font script="Yiii" typeface="Microsoft Yi Baiti"/>
+        <a:font script="Tibt" typeface="Microsoft Himalaya"/>
+        <a:font script="Thaa" typeface="MV Boli"/>
+        <a:font script="Deva" typeface="Mangal"/>
+        <a:font script="Telu" typeface="Gautami"/>
+        <a:font script="Taml" typeface="Latha"/>
+        <a:font script="Syrc" typeface="Estrangelo Edessa"/>
+        <a:font script="Orya" typeface="Kalinga"/>
+        <a:font script="Mlym" typeface="Kartika"/>
+        <a:font script="Laoo" typeface="DokChampa"/>
+        <a:font script="Sinh" typeface="Iskoola Pota"/>
+        <a:font script="Mong" typeface="Mongolian Baiti"/>
+        <a:font script="Viet" typeface="Arial"/>
+        <a:font script="Uigh" typeface="Microsoft Uighur"/>
+      </a:minorFont>
+    </a:fontScheme>
+    <a:fmtScheme name="Escritório">
+      <a:fillStyleLst>
+        <a:solidFill>
+          <a:schemeClr val="phClr"/>
+        </a:solidFill>
+        <a:gradFill rotWithShape="1">
+          <a:gsLst>
+            <a:gs pos="0">
+              <a:schemeClr val="phClr">
+                <a:tint val="50000"/>
+                <a:satMod val="300000"/>
+              </a:schemeClr>
+            </a:gs>
+            <a:gs pos="35000">
+              <a:schemeClr val="phClr">
+                <a:tint val="37000"/>
+                <a:satMod val="300000"/>
+              </a:schemeClr>
+            </a:gs>
+            <a:gs pos="100000">
+              <a:schemeClr val="phClr">
+                <a:tint val="15000"/>
+                <a:satMod val="350000"/>
+              </a:schemeClr>
+            </a:gs>
+          </a:gsLst>
+          <a:lin ang="16200000" scaled="1"/>
+        </a:gradFill>
+        <a:gradFill rotWithShape="1">
+          <a:gsLst>
+            <a:gs pos="0">
+              <a:schemeClr val="phClr">
+                <a:shade val="51000"/>
+                <a:satMod val="130000"/>
+              </a:schemeClr>
+            </a:gs>
+            <a:gs pos="80000">
+              <a:schemeClr val="phClr">
+                <a:shade val="93000"/>
+                <a:satMod val="130000"/>
+              </a:schemeClr>
+            </a:gs>
+            <a:gs pos="100000">
+              <a:schemeClr val="phClr">
+                <a:shade val="94000"/>
+                <a:satMod val="135000"/>
+              </a:schemeClr>
+            </a:gs>
+          </a:gsLst>
+          <a:lin ang="16200000" scaled="0"/>
+        </a:gradFill>
+      </a:fillStyleLst>
+      <a:lnStyleLst>
+        <a:ln w="9525" cap="flat" cmpd="sng" algn="ctr">
+          <a:solidFill>
+            <a:schemeClr val="phClr">
+              <a:shade val="95000"/>
+              <a:satMod val="105000"/>
+            </a:schemeClr>
+          </a:solidFill>
+          <a:prstDash val="solid"/>
+        </a:ln>
+        <a:ln w="25400" cap="flat" cmpd="sng" algn="ctr">
+          <a:solidFill>
+            <a:schemeClr val="phClr"/>
+          </a:solidFill>
+          <a:prstDash val="solid"/>
+        </a:ln>
+        <a:ln w="38100" cap="flat" cmpd="sng" algn="ctr">
+          <a:solidFill>
+            <a:schemeClr val="phClr"/>
+          </a:solidFill>
+          <a:prstDash val="solid"/>
+        </a:ln>
+      </a:lnStyleLst>
+      <a:effectStyleLst>
+        <a:effectStyle>
+          <a:effectLst>
+            <a:outerShdw blurRad="40000" dist="20000" dir="5400000" rotWithShape="0">
+              <a:srgbClr val="000000">
+                <a:alpha val="38000"/>
+              </a:srgbClr>
+            </a:outerShdw>
+          </a:effectLst>
+        </a:effectStyle>
+        <a:effectStyle>
+          <a:effectLst>
+            <a:outerShdw blurRad="40000" dist="23000" dir="5400000" rotWithShape="0">
+              <a:srgbClr val="000000">
+                <a:alpha val="35000"/>
+              </a:srgbClr>
+            </a:outerShdw>
+          </a:effectLst>
+        </a:effectStyle>
+        <a:effectStyle>
+          <a:effectLst>
+            <a:outerShdw blurRad="40000" dist="23000" dir="5400000" rotWithShape="0">
+              <a:srgbClr val="000000">
+                <a:alpha val="35000"/>
+              </a:srgbClr>
+            </a:outerShdw>
+          </a:effectLst>
+          <a:scene3d>
+            <a:camera prst="orthographicFront">
+              <a:rot lat="0" lon="0" rev="0"/>
+            </a:camera>
+            <a:lightRig rig="threePt" dir="t">
+              <a:rot lat="0" lon="0" rev="1200000"/>
+            </a:lightRig>
+          </a:scene3d>
+          <a:sp3d>
+            <a:bevelT w="63500" h="25400"/>
+          </a:sp3d>
+        </a:effectStyle>
+      </a:effectStyleLst>
+      <a:bgFillStyleLst>
+        <a:solidFill>
+          <a:schemeClr val="phClr"/>
+        </a:solidFill>
+        <a:gradFill rotWithShape="1">
+          <a:gsLst>
+            <a:gs pos="0">
+              <a:schemeClr val="phClr">
+                <a:tint val="40000"/>
+                <a:satMod val="350000"/>
+              </a:schemeClr>
+            </a:gs>
+            <a:gs pos="40000">
+              <a:schemeClr val="phClr">
+                <a:tint val="45000"/>
+                <a:shade val="99000"/>
+                <a:satMod val="350000"/>
+              </a:schemeClr>
+            </a:gs>
+            <a:gs pos="100000">
+              <a:schemeClr val="phClr">
+                <a:shade val="20000"/>
+                <a:satMod val="255000"/>
+              </a:schemeClr>
+            </a:gs>
+          </a:gsLst>
+          <a:path path="circle">
+            <a:fillToRect l="50000" t="-80000" r="50000" b="180000"/>
+          </a:path>
+        </a:gradFill>
+        <a:gradFill rotWithShape="1">
+          <a:gsLst>
+            <a:gs pos="0">
+              <a:schemeClr val="phClr">
+                <a:tint val="80000"/>
+                <a:satMod val="300000"/>
+              </a:schemeClr>
+            </a:gs>
+            <a:gs pos="100000">
+              <a:schemeClr val="phClr">
+                <a:shade val="30000"/>
+                <a:satMod val="200000"/>
+              </a:schemeClr>
+            </a:gs>
+          </a:gsLst>
+          <a:path path="circle">
+            <a:fillToRect l="50000" t="50000" r="50000" b="50000"/>
+          </a:path>
+        </a:gradFill>
+      </a:bgFillStyleLst>
+    </a:fmtScheme>
+  </a:themeElements>
+  <a:objectDefaults/>
+  <a:extraClrSchemeLst/>
+</a:theme>
 </file>
</xml_diff>